<commit_message>
Harj 3 tiedostot lisätty
</commit_message>
<xml_diff>
--- a/rakennekaavio.pptx
+++ b/rakennekaavio.pptx
@@ -5,7 +5,7 @@
     <p:sldMasterId id="2147483648" r:id="rId1"/>
   </p:sldMasterIdLst>
   <p:sldIdLst>
-    <p:sldId id="256" r:id="rId2"/>
+    <p:sldId id="257" r:id="rId2"/>
   </p:sldIdLst>
   <p:sldSz cx="12192000" cy="6858000"/>
   <p:notesSz cx="6858000" cy="9144000"/>
@@ -104,6 +104,11 @@
       </a:defRPr>
     </a:lvl9pPr>
   </p:defaultTextStyle>
+  <p:extLst>
+    <p:ext uri="{EFAFB233-063F-42B5-8137-9DF3F51BA10A}">
+      <p15:sldGuideLst xmlns:p15="http://schemas.microsoft.com/office/powerpoint/2012/main"/>
+    </p:ext>
+  </p:extLst>
 </p:presentation>
 </file>
 
@@ -895,43 +900,6 @@
       </dgm:t>
     </dgm:pt>
     <dgm:pt modelId="{89EB819A-4CDE-44A0-A816-DE01FFD79FEB}" type="sibTrans" cxnId="{F8BD89B4-41B4-44A6-A5AC-7CE4966940E4}">
-      <dgm:prSet/>
-      <dgm:spPr/>
-      <dgm:t>
-        <a:bodyPr/>
-        <a:lstStyle/>
-        <a:p>
-          <a:endParaRPr lang="fi-FI"/>
-        </a:p>
-      </dgm:t>
-    </dgm:pt>
-    <dgm:pt modelId="{F4257952-D032-492B-A69C-ECE69D2FA3CE}">
-      <dgm:prSet phldrT="[Text]"/>
-      <dgm:spPr/>
-      <dgm:t>
-        <a:bodyPr/>
-        <a:lstStyle/>
-        <a:p>
-          <a:r>
-            <a:rPr lang="en-GB" dirty="0" err="1"/>
-            <a:t>Aloitussivu</a:t>
-          </a:r>
-          <a:endParaRPr lang="fi-FI" dirty="0"/>
-        </a:p>
-      </dgm:t>
-    </dgm:pt>
-    <dgm:pt modelId="{5D19FF41-10CE-4172-9372-0C22FAA5DBE1}" type="parTrans" cxnId="{00119144-6E41-4041-AFA7-8E9F4DD0A66A}">
-      <dgm:prSet/>
-      <dgm:spPr/>
-      <dgm:t>
-        <a:bodyPr/>
-        <a:lstStyle/>
-        <a:p>
-          <a:endParaRPr lang="fi-FI"/>
-        </a:p>
-      </dgm:t>
-    </dgm:pt>
-    <dgm:pt modelId="{A15686CD-95D3-4205-9142-66D951BD5574}" type="sibTrans" cxnId="{00119144-6E41-4041-AFA7-8E9F4DD0A66A}">
       <dgm:prSet/>
       <dgm:spPr/>
       <dgm:t>
@@ -1023,6 +991,10 @@
         <a:bodyPr/>
         <a:lstStyle/>
         <a:p>
+          <a:r>
+            <a:rPr lang="en-GB" dirty="0" err="1"/>
+            <a:t>Testaus</a:t>
+          </a:r>
           <a:endParaRPr lang="fi-FI" dirty="0"/>
         </a:p>
       </dgm:t>
@@ -1086,6 +1058,117 @@
         </a:p>
       </dgm:t>
     </dgm:pt>
+    <dgm:pt modelId="{B761BCB4-B5AF-4FDB-8C72-650ADB81B67D}">
+      <dgm:prSet phldrT="[Text]"/>
+      <dgm:spPr/>
+      <dgm:t>
+        <a:bodyPr/>
+        <a:lstStyle/>
+        <a:p>
+          <a:r>
+            <a:rPr lang="en-GB" dirty="0"/>
+            <a:t>Html</a:t>
+          </a:r>
+          <a:endParaRPr lang="fi-FI" dirty="0"/>
+        </a:p>
+      </dgm:t>
+    </dgm:pt>
+    <dgm:pt modelId="{852E708E-E59E-466E-BCCE-D775428703A2}" type="parTrans" cxnId="{7452B3E9-3801-443E-93C9-DF855B9AC23A}">
+      <dgm:prSet/>
+      <dgm:spPr/>
+      <dgm:t>
+        <a:bodyPr/>
+        <a:lstStyle/>
+        <a:p>
+          <a:endParaRPr lang="fi-FI"/>
+        </a:p>
+      </dgm:t>
+    </dgm:pt>
+    <dgm:pt modelId="{0DFE344B-FC2A-4CB8-A7E0-6CDBF7F43F3C}" type="sibTrans" cxnId="{7452B3E9-3801-443E-93C9-DF855B9AC23A}">
+      <dgm:prSet/>
+      <dgm:spPr/>
+      <dgm:t>
+        <a:bodyPr/>
+        <a:lstStyle/>
+        <a:p>
+          <a:endParaRPr lang="fi-FI"/>
+        </a:p>
+      </dgm:t>
+    </dgm:pt>
+    <dgm:pt modelId="{F7011F9B-7EA4-4DE1-B5D0-84B0DFD92BC8}">
+      <dgm:prSet phldrT="[Text]"/>
+      <dgm:spPr/>
+      <dgm:t>
+        <a:bodyPr/>
+        <a:lstStyle/>
+        <a:p>
+          <a:r>
+            <a:rPr lang="en-GB" dirty="0" err="1"/>
+            <a:t>Javascript</a:t>
+          </a:r>
+          <a:endParaRPr lang="fi-FI" dirty="0"/>
+        </a:p>
+      </dgm:t>
+    </dgm:pt>
+    <dgm:pt modelId="{1E116DF0-D99B-4A80-933C-4783FE18EF65}" type="parTrans" cxnId="{19BC33F6-89FE-434C-8116-85E7151DD72F}">
+      <dgm:prSet/>
+      <dgm:spPr/>
+      <dgm:t>
+        <a:bodyPr/>
+        <a:lstStyle/>
+        <a:p>
+          <a:endParaRPr lang="fi-FI"/>
+        </a:p>
+      </dgm:t>
+    </dgm:pt>
+    <dgm:pt modelId="{F7275817-76AE-472F-A278-92A7CEDD8515}" type="sibTrans" cxnId="{19BC33F6-89FE-434C-8116-85E7151DD72F}">
+      <dgm:prSet/>
+      <dgm:spPr/>
+      <dgm:t>
+        <a:bodyPr/>
+        <a:lstStyle/>
+        <a:p>
+          <a:endParaRPr lang="fi-FI"/>
+        </a:p>
+      </dgm:t>
+    </dgm:pt>
+    <dgm:pt modelId="{E36E70FE-67E8-4496-ABF5-A4CAD18EA4B2}">
+      <dgm:prSet phldrT="[Text]"/>
+      <dgm:spPr/>
+      <dgm:t>
+        <a:bodyPr/>
+        <a:lstStyle/>
+        <a:p>
+          <a:r>
+            <a:rPr lang="en-GB" dirty="0"/>
+            <a:t>REST</a:t>
+          </a:r>
+          <a:endParaRPr lang="fi-FI" dirty="0"/>
+        </a:p>
+      </dgm:t>
+    </dgm:pt>
+    <dgm:pt modelId="{9ABB4123-E535-4E3F-8CB4-BBCBE93D6093}" type="parTrans" cxnId="{21B375CE-DB10-42A6-B6DE-BBEF5E4E3902}">
+      <dgm:prSet/>
+      <dgm:spPr/>
+      <dgm:t>
+        <a:bodyPr/>
+        <a:lstStyle/>
+        <a:p>
+          <a:endParaRPr lang="fi-FI"/>
+        </a:p>
+      </dgm:t>
+    </dgm:pt>
+    <dgm:pt modelId="{4BCF421B-7DCE-4B1F-B080-101F558DCE5C}" type="sibTrans" cxnId="{21B375CE-DB10-42A6-B6DE-BBEF5E4E3902}">
+      <dgm:prSet/>
+      <dgm:spPr/>
+      <dgm:t>
+        <a:bodyPr/>
+        <a:lstStyle/>
+        <a:p>
+          <a:endParaRPr lang="fi-FI"/>
+        </a:p>
+      </dgm:t>
+    </dgm:pt>
     <dgm:pt modelId="{376B0564-B1E6-4D9C-8CF6-8AE7C9AE6A14}" type="pres">
       <dgm:prSet presAssocID="{6550B864-F475-4D4B-AF95-40616CFF7B34}" presName="hierChild1" presStyleCnt="0">
         <dgm:presLayoutVars>
@@ -1122,36 +1205,8 @@
       <dgm:prSet presAssocID="{669BC9A0-B2B3-4D13-B541-8EB8DA088DBB}" presName="hierChild2" presStyleCnt="0"/>
       <dgm:spPr/>
     </dgm:pt>
-    <dgm:pt modelId="{1B3D64C7-8B03-4B70-B09D-06731EADEE92}" type="pres">
-      <dgm:prSet presAssocID="{5D19FF41-10CE-4172-9372-0C22FAA5DBE1}" presName="Name10" presStyleLbl="parChTrans1D2" presStyleIdx="0" presStyleCnt="5"/>
-      <dgm:spPr/>
-    </dgm:pt>
-    <dgm:pt modelId="{C8110DC6-C185-40DA-8F1D-5C05C6C4026D}" type="pres">
-      <dgm:prSet presAssocID="{F4257952-D032-492B-A69C-ECE69D2FA3CE}" presName="hierRoot2" presStyleCnt="0"/>
-      <dgm:spPr/>
-    </dgm:pt>
-    <dgm:pt modelId="{C4E21DDE-CAB2-46A9-9DEC-01BCE1546F27}" type="pres">
-      <dgm:prSet presAssocID="{F4257952-D032-492B-A69C-ECE69D2FA3CE}" presName="composite2" presStyleCnt="0"/>
-      <dgm:spPr/>
-    </dgm:pt>
-    <dgm:pt modelId="{342E2BCF-39E2-442D-9250-3A8B0DCE8AD5}" type="pres">
-      <dgm:prSet presAssocID="{F4257952-D032-492B-A69C-ECE69D2FA3CE}" presName="background2" presStyleLbl="node2" presStyleIdx="0" presStyleCnt="5"/>
-      <dgm:spPr/>
-    </dgm:pt>
-    <dgm:pt modelId="{26D480A3-7576-43E3-A933-0D6272033705}" type="pres">
-      <dgm:prSet presAssocID="{F4257952-D032-492B-A69C-ECE69D2FA3CE}" presName="text2" presStyleLbl="fgAcc2" presStyleIdx="0" presStyleCnt="5">
-        <dgm:presLayoutVars>
-          <dgm:chPref val="3"/>
-        </dgm:presLayoutVars>
-      </dgm:prSet>
-      <dgm:spPr/>
-    </dgm:pt>
-    <dgm:pt modelId="{2FEDB332-2426-4870-B549-DC65831E59A4}" type="pres">
-      <dgm:prSet presAssocID="{F4257952-D032-492B-A69C-ECE69D2FA3CE}" presName="hierChild3" presStyleCnt="0"/>
-      <dgm:spPr/>
-    </dgm:pt>
     <dgm:pt modelId="{A6F6C4F5-0E73-4D96-ADA6-B17CCFE09FCF}" type="pres">
-      <dgm:prSet presAssocID="{DA7F0119-12FB-41A9-A680-247C4116E40D}" presName="Name10" presStyleLbl="parChTrans1D2" presStyleIdx="1" presStyleCnt="5"/>
+      <dgm:prSet presAssocID="{DA7F0119-12FB-41A9-A680-247C4116E40D}" presName="Name10" presStyleLbl="parChTrans1D2" presStyleIdx="0" presStyleCnt="4"/>
       <dgm:spPr/>
     </dgm:pt>
     <dgm:pt modelId="{E9AB1FFB-8A62-4863-BF36-82199CC14DDA}" type="pres">
@@ -1163,11 +1218,11 @@
       <dgm:spPr/>
     </dgm:pt>
     <dgm:pt modelId="{F142D87D-864D-47D7-95D9-3D98B6F4C119}" type="pres">
-      <dgm:prSet presAssocID="{F3CCBC27-70C9-4FAA-B187-7399575AC688}" presName="background2" presStyleLbl="node2" presStyleIdx="1" presStyleCnt="5"/>
+      <dgm:prSet presAssocID="{F3CCBC27-70C9-4FAA-B187-7399575AC688}" presName="background2" presStyleLbl="node2" presStyleIdx="0" presStyleCnt="4"/>
       <dgm:spPr/>
     </dgm:pt>
     <dgm:pt modelId="{5AFE67C6-4CA5-4EEC-BE7E-2653985296FD}" type="pres">
-      <dgm:prSet presAssocID="{F3CCBC27-70C9-4FAA-B187-7399575AC688}" presName="text2" presStyleLbl="fgAcc2" presStyleIdx="1" presStyleCnt="5">
+      <dgm:prSet presAssocID="{F3CCBC27-70C9-4FAA-B187-7399575AC688}" presName="text2" presStyleLbl="fgAcc2" presStyleIdx="0" presStyleCnt="4">
         <dgm:presLayoutVars>
           <dgm:chPref val="3"/>
         </dgm:presLayoutVars>
@@ -1179,7 +1234,7 @@
       <dgm:spPr/>
     </dgm:pt>
     <dgm:pt modelId="{A5FA6E6B-BC7E-46D7-9019-D27F3D5F576F}" type="pres">
-      <dgm:prSet presAssocID="{62DC5DB8-2A8E-4669-A7B4-1292FBB7EF96}" presName="Name10" presStyleLbl="parChTrans1D2" presStyleIdx="2" presStyleCnt="5"/>
+      <dgm:prSet presAssocID="{62DC5DB8-2A8E-4669-A7B4-1292FBB7EF96}" presName="Name10" presStyleLbl="parChTrans1D2" presStyleIdx="1" presStyleCnt="4"/>
       <dgm:spPr/>
     </dgm:pt>
     <dgm:pt modelId="{89222010-A974-4D3C-B6E8-AF89C1AC11A4}" type="pres">
@@ -1191,11 +1246,11 @@
       <dgm:spPr/>
     </dgm:pt>
     <dgm:pt modelId="{F08448E1-306A-42C4-BD47-5D4373884F88}" type="pres">
-      <dgm:prSet presAssocID="{0BB689BB-F006-4831-914E-4070CD6A639A}" presName="background2" presStyleLbl="node2" presStyleIdx="2" presStyleCnt="5"/>
+      <dgm:prSet presAssocID="{0BB689BB-F006-4831-914E-4070CD6A639A}" presName="background2" presStyleLbl="node2" presStyleIdx="1" presStyleCnt="4"/>
       <dgm:spPr/>
     </dgm:pt>
     <dgm:pt modelId="{369C72AF-1E4C-49D3-A6F3-6AE1571AEA6D}" type="pres">
-      <dgm:prSet presAssocID="{0BB689BB-F006-4831-914E-4070CD6A639A}" presName="text2" presStyleLbl="fgAcc2" presStyleIdx="2" presStyleCnt="5">
+      <dgm:prSet presAssocID="{0BB689BB-F006-4831-914E-4070CD6A639A}" presName="text2" presStyleLbl="fgAcc2" presStyleIdx="1" presStyleCnt="4">
         <dgm:presLayoutVars>
           <dgm:chPref val="3"/>
         </dgm:presLayoutVars>
@@ -1207,7 +1262,7 @@
       <dgm:spPr/>
     </dgm:pt>
     <dgm:pt modelId="{5B388A4D-036F-4066-BBFB-C947D45D276A}" type="pres">
-      <dgm:prSet presAssocID="{3E5F0B38-6BAD-4C8A-AC50-464969E9669A}" presName="Name10" presStyleLbl="parChTrans1D2" presStyleIdx="3" presStyleCnt="5"/>
+      <dgm:prSet presAssocID="{3E5F0B38-6BAD-4C8A-AC50-464969E9669A}" presName="Name10" presStyleLbl="parChTrans1D2" presStyleIdx="2" presStyleCnt="4"/>
       <dgm:spPr/>
     </dgm:pt>
     <dgm:pt modelId="{A9822B2D-EA55-4E11-B686-74B074AAFD2E}" type="pres">
@@ -1219,11 +1274,11 @@
       <dgm:spPr/>
     </dgm:pt>
     <dgm:pt modelId="{D181B7E1-F142-4855-BF32-6B99A157D5B7}" type="pres">
-      <dgm:prSet presAssocID="{4D7DA046-92D8-48DD-B3E2-6A3CB704EEA2}" presName="background2" presStyleLbl="node2" presStyleIdx="3" presStyleCnt="5"/>
+      <dgm:prSet presAssocID="{4D7DA046-92D8-48DD-B3E2-6A3CB704EEA2}" presName="background2" presStyleLbl="node2" presStyleIdx="2" presStyleCnt="4"/>
       <dgm:spPr/>
     </dgm:pt>
     <dgm:pt modelId="{21077167-5E85-46CE-96E2-17957D918597}" type="pres">
-      <dgm:prSet presAssocID="{4D7DA046-92D8-48DD-B3E2-6A3CB704EEA2}" presName="text2" presStyleLbl="fgAcc2" presStyleIdx="3" presStyleCnt="5">
+      <dgm:prSet presAssocID="{4D7DA046-92D8-48DD-B3E2-6A3CB704EEA2}" presName="text2" presStyleLbl="fgAcc2" presStyleIdx="2" presStyleCnt="4">
         <dgm:presLayoutVars>
           <dgm:chPref val="3"/>
         </dgm:presLayoutVars>
@@ -1234,89 +1289,191 @@
       <dgm:prSet presAssocID="{4D7DA046-92D8-48DD-B3E2-6A3CB704EEA2}" presName="hierChild3" presStyleCnt="0"/>
       <dgm:spPr/>
     </dgm:pt>
-    <dgm:pt modelId="{BA765BEA-4CE8-45C8-BAC2-9870E912E7FC}" type="pres">
-      <dgm:prSet presAssocID="{2BEE67C3-65C1-49BB-A00F-136894D14E74}" presName="Name10" presStyleLbl="parChTrans1D2" presStyleIdx="4" presStyleCnt="5"/>
+    <dgm:pt modelId="{D2297475-3E0F-4C09-8849-306450C68434}" type="pres">
+      <dgm:prSet presAssocID="{2BEE67C3-65C1-49BB-A00F-136894D14E74}" presName="Name10" presStyleLbl="parChTrans1D2" presStyleIdx="3" presStyleCnt="4"/>
       <dgm:spPr/>
     </dgm:pt>
-    <dgm:pt modelId="{B6BE4B8D-E6C1-449D-B0B7-EFAA0B01F4D8}" type="pres">
+    <dgm:pt modelId="{B693BC37-3480-411E-9CCE-3E29ED18D9EF}" type="pres">
       <dgm:prSet presAssocID="{8F74700D-6B63-418B-B3FC-D412EBEF9512}" presName="hierRoot2" presStyleCnt="0"/>
       <dgm:spPr/>
     </dgm:pt>
-    <dgm:pt modelId="{D3F07459-A75B-4608-A30B-A5B819EAAD6A}" type="pres">
+    <dgm:pt modelId="{34D67B9B-509A-4533-A8C1-05BBFE56C7CC}" type="pres">
       <dgm:prSet presAssocID="{8F74700D-6B63-418B-B3FC-D412EBEF9512}" presName="composite2" presStyleCnt="0"/>
       <dgm:spPr/>
     </dgm:pt>
-    <dgm:pt modelId="{AA6E0DDA-D889-44AF-BBD0-D61FF7156885}" type="pres">
-      <dgm:prSet presAssocID="{8F74700D-6B63-418B-B3FC-D412EBEF9512}" presName="background2" presStyleLbl="node2" presStyleIdx="4" presStyleCnt="5"/>
+    <dgm:pt modelId="{D233D6D2-054F-48E7-8C44-C0FD9A30C172}" type="pres">
+      <dgm:prSet presAssocID="{8F74700D-6B63-418B-B3FC-D412EBEF9512}" presName="background2" presStyleLbl="node2" presStyleIdx="3" presStyleCnt="4"/>
       <dgm:spPr/>
     </dgm:pt>
-    <dgm:pt modelId="{70893F41-43BD-430E-B0DB-F10C9F9F04A9}" type="pres">
-      <dgm:prSet presAssocID="{8F74700D-6B63-418B-B3FC-D412EBEF9512}" presName="text2" presStyleLbl="fgAcc2" presStyleIdx="4" presStyleCnt="5">
+    <dgm:pt modelId="{27C4145F-0850-4FE2-82D8-463685F5081F}" type="pres">
+      <dgm:prSet presAssocID="{8F74700D-6B63-418B-B3FC-D412EBEF9512}" presName="text2" presStyleLbl="fgAcc2" presStyleIdx="3" presStyleCnt="4">
         <dgm:presLayoutVars>
           <dgm:chPref val="3"/>
         </dgm:presLayoutVars>
       </dgm:prSet>
       <dgm:spPr/>
     </dgm:pt>
-    <dgm:pt modelId="{834BF605-342F-4FCD-A8D2-78967B5085AE}" type="pres">
+    <dgm:pt modelId="{17A8E2FA-173A-4B33-8187-31F3C191A048}" type="pres">
       <dgm:prSet presAssocID="{8F74700D-6B63-418B-B3FC-D412EBEF9512}" presName="hierChild3" presStyleCnt="0"/>
+      <dgm:spPr/>
+    </dgm:pt>
+    <dgm:pt modelId="{EABC2E14-4834-4844-ADCF-8D2CAE420D7B}" type="pres">
+      <dgm:prSet presAssocID="{852E708E-E59E-466E-BCCE-D775428703A2}" presName="Name17" presStyleLbl="parChTrans1D3" presStyleIdx="0" presStyleCnt="3"/>
+      <dgm:spPr/>
+    </dgm:pt>
+    <dgm:pt modelId="{A8B05336-5BC0-4D69-8191-085163287556}" type="pres">
+      <dgm:prSet presAssocID="{B761BCB4-B5AF-4FDB-8C72-650ADB81B67D}" presName="hierRoot3" presStyleCnt="0"/>
+      <dgm:spPr/>
+    </dgm:pt>
+    <dgm:pt modelId="{FFE32ED9-747F-4E10-9688-F0A292CADDE5}" type="pres">
+      <dgm:prSet presAssocID="{B761BCB4-B5AF-4FDB-8C72-650ADB81B67D}" presName="composite3" presStyleCnt="0"/>
+      <dgm:spPr/>
+    </dgm:pt>
+    <dgm:pt modelId="{DB80E178-DDA6-4A8F-B88C-E9B43EB86991}" type="pres">
+      <dgm:prSet presAssocID="{B761BCB4-B5AF-4FDB-8C72-650ADB81B67D}" presName="background3" presStyleLbl="node3" presStyleIdx="0" presStyleCnt="3"/>
+      <dgm:spPr/>
+    </dgm:pt>
+    <dgm:pt modelId="{166D3F28-A84D-46C3-A0DA-B2C2351FE975}" type="pres">
+      <dgm:prSet presAssocID="{B761BCB4-B5AF-4FDB-8C72-650ADB81B67D}" presName="text3" presStyleLbl="fgAcc3" presStyleIdx="0" presStyleCnt="3">
+        <dgm:presLayoutVars>
+          <dgm:chPref val="3"/>
+        </dgm:presLayoutVars>
+      </dgm:prSet>
+      <dgm:spPr/>
+    </dgm:pt>
+    <dgm:pt modelId="{DBBD6D74-8B39-4193-884F-4392181B9D45}" type="pres">
+      <dgm:prSet presAssocID="{B761BCB4-B5AF-4FDB-8C72-650ADB81B67D}" presName="hierChild4" presStyleCnt="0"/>
+      <dgm:spPr/>
+    </dgm:pt>
+    <dgm:pt modelId="{D5579671-A2DC-4EE7-BF89-BAF9484F892F}" type="pres">
+      <dgm:prSet presAssocID="{1E116DF0-D99B-4A80-933C-4783FE18EF65}" presName="Name17" presStyleLbl="parChTrans1D3" presStyleIdx="1" presStyleCnt="3"/>
+      <dgm:spPr/>
+    </dgm:pt>
+    <dgm:pt modelId="{06210B39-36B8-4536-A6AC-BA4F9974B3AD}" type="pres">
+      <dgm:prSet presAssocID="{F7011F9B-7EA4-4DE1-B5D0-84B0DFD92BC8}" presName="hierRoot3" presStyleCnt="0"/>
+      <dgm:spPr/>
+    </dgm:pt>
+    <dgm:pt modelId="{7E4A2007-5FD0-4E74-B87C-A93CAA392A80}" type="pres">
+      <dgm:prSet presAssocID="{F7011F9B-7EA4-4DE1-B5D0-84B0DFD92BC8}" presName="composite3" presStyleCnt="0"/>
+      <dgm:spPr/>
+    </dgm:pt>
+    <dgm:pt modelId="{71264332-18D3-4467-A50C-098BA6A39018}" type="pres">
+      <dgm:prSet presAssocID="{F7011F9B-7EA4-4DE1-B5D0-84B0DFD92BC8}" presName="background3" presStyleLbl="node3" presStyleIdx="1" presStyleCnt="3"/>
+      <dgm:spPr/>
+    </dgm:pt>
+    <dgm:pt modelId="{74D8FE33-3EE2-44C7-923F-A1AA6E48FD3E}" type="pres">
+      <dgm:prSet presAssocID="{F7011F9B-7EA4-4DE1-B5D0-84B0DFD92BC8}" presName="text3" presStyleLbl="fgAcc3" presStyleIdx="1" presStyleCnt="3">
+        <dgm:presLayoutVars>
+          <dgm:chPref val="3"/>
+        </dgm:presLayoutVars>
+      </dgm:prSet>
+      <dgm:spPr/>
+    </dgm:pt>
+    <dgm:pt modelId="{F946B448-6A5D-48E6-8E02-A285D6CF328D}" type="pres">
+      <dgm:prSet presAssocID="{F7011F9B-7EA4-4DE1-B5D0-84B0DFD92BC8}" presName="hierChild4" presStyleCnt="0"/>
+      <dgm:spPr/>
+    </dgm:pt>
+    <dgm:pt modelId="{CA041F28-29CF-4632-AF3F-8B93F93362DE}" type="pres">
+      <dgm:prSet presAssocID="{9ABB4123-E535-4E3F-8CB4-BBCBE93D6093}" presName="Name17" presStyleLbl="parChTrans1D3" presStyleIdx="2" presStyleCnt="3"/>
+      <dgm:spPr/>
+    </dgm:pt>
+    <dgm:pt modelId="{9E39DF17-389F-4765-A629-1247FE541928}" type="pres">
+      <dgm:prSet presAssocID="{E36E70FE-67E8-4496-ABF5-A4CAD18EA4B2}" presName="hierRoot3" presStyleCnt="0"/>
+      <dgm:spPr/>
+    </dgm:pt>
+    <dgm:pt modelId="{866E06AE-8A23-48F8-8365-80CC1E33112B}" type="pres">
+      <dgm:prSet presAssocID="{E36E70FE-67E8-4496-ABF5-A4CAD18EA4B2}" presName="composite3" presStyleCnt="0"/>
+      <dgm:spPr/>
+    </dgm:pt>
+    <dgm:pt modelId="{8CB573EC-A82F-4E7C-B633-A38BF714D7B9}" type="pres">
+      <dgm:prSet presAssocID="{E36E70FE-67E8-4496-ABF5-A4CAD18EA4B2}" presName="background3" presStyleLbl="node3" presStyleIdx="2" presStyleCnt="3"/>
+      <dgm:spPr/>
+    </dgm:pt>
+    <dgm:pt modelId="{2F1DC9E2-3989-4D02-8C6B-4F714375E318}" type="pres">
+      <dgm:prSet presAssocID="{E36E70FE-67E8-4496-ABF5-A4CAD18EA4B2}" presName="text3" presStyleLbl="fgAcc3" presStyleIdx="2" presStyleCnt="3">
+        <dgm:presLayoutVars>
+          <dgm:chPref val="3"/>
+        </dgm:presLayoutVars>
+      </dgm:prSet>
+      <dgm:spPr/>
+    </dgm:pt>
+    <dgm:pt modelId="{6D77C42C-785F-416B-AEEE-0125B7DC208C}" type="pres">
+      <dgm:prSet presAssocID="{E36E70FE-67E8-4496-ABF5-A4CAD18EA4B2}" presName="hierChild4" presStyleCnt="0"/>
       <dgm:spPr/>
     </dgm:pt>
   </dgm:ptLst>
   <dgm:cxnLst>
-    <dgm:cxn modelId="{1F4A6214-28EF-4671-BBA2-957D7ED4DAB5}" srcId="{669BC9A0-B2B3-4D13-B541-8EB8DA088DBB}" destId="{F3CCBC27-70C9-4FAA-B187-7399575AC688}" srcOrd="1" destOrd="0" parTransId="{DA7F0119-12FB-41A9-A680-247C4116E40D}" sibTransId="{BA757C23-EE5C-4EC7-962A-1DDFF2B77E0D}"/>
-    <dgm:cxn modelId="{FDED2B2B-BA67-4DE3-AEB2-7F659BF8D844}" type="presOf" srcId="{5D19FF41-10CE-4172-9372-0C22FAA5DBE1}" destId="{1B3D64C7-8B03-4B70-B09D-06731EADEE92}" srcOrd="0" destOrd="0" presId="urn:microsoft.com/office/officeart/2005/8/layout/hierarchy1"/>
-    <dgm:cxn modelId="{00119144-6E41-4041-AFA7-8E9F4DD0A66A}" srcId="{669BC9A0-B2B3-4D13-B541-8EB8DA088DBB}" destId="{F4257952-D032-492B-A69C-ECE69D2FA3CE}" srcOrd="0" destOrd="0" parTransId="{5D19FF41-10CE-4172-9372-0C22FAA5DBE1}" sibTransId="{A15686CD-95D3-4205-9142-66D951BD5574}"/>
-    <dgm:cxn modelId="{DF8C5145-8373-44F4-B0D5-D6097C5E3809}" srcId="{669BC9A0-B2B3-4D13-B541-8EB8DA088DBB}" destId="{0BB689BB-F006-4831-914E-4070CD6A639A}" srcOrd="2" destOrd="0" parTransId="{62DC5DB8-2A8E-4669-A7B4-1292FBB7EF96}" sibTransId="{D0D64F6F-6B5C-44A1-A4D9-520EF30A6367}"/>
-    <dgm:cxn modelId="{607C1D46-8B01-49BE-B819-18A17E0FB6C8}" type="presOf" srcId="{8F74700D-6B63-418B-B3FC-D412EBEF9512}" destId="{70893F41-43BD-430E-B0DB-F10C9F9F04A9}" srcOrd="0" destOrd="0" presId="urn:microsoft.com/office/officeart/2005/8/layout/hierarchy1"/>
+    <dgm:cxn modelId="{1F4A6214-28EF-4671-BBA2-957D7ED4DAB5}" srcId="{669BC9A0-B2B3-4D13-B541-8EB8DA088DBB}" destId="{F3CCBC27-70C9-4FAA-B187-7399575AC688}" srcOrd="0" destOrd="0" parTransId="{DA7F0119-12FB-41A9-A680-247C4116E40D}" sibTransId="{BA757C23-EE5C-4EC7-962A-1DDFF2B77E0D}"/>
+    <dgm:cxn modelId="{C5C30116-69FB-494B-9ED6-C4E7D8E116C1}" type="presOf" srcId="{8F74700D-6B63-418B-B3FC-D412EBEF9512}" destId="{27C4145F-0850-4FE2-82D8-463685F5081F}" srcOrd="0" destOrd="0" presId="urn:microsoft.com/office/officeart/2005/8/layout/hierarchy1"/>
+    <dgm:cxn modelId="{DF8C5145-8373-44F4-B0D5-D6097C5E3809}" srcId="{669BC9A0-B2B3-4D13-B541-8EB8DA088DBB}" destId="{0BB689BB-F006-4831-914E-4070CD6A639A}" srcOrd="1" destOrd="0" parTransId="{62DC5DB8-2A8E-4669-A7B4-1292FBB7EF96}" sibTransId="{D0D64F6F-6B5C-44A1-A4D9-520EF30A6367}"/>
     <dgm:cxn modelId="{1FDE7650-3C3A-419B-978E-C7FD1DD75AB7}" type="presOf" srcId="{DA7F0119-12FB-41A9-A680-247C4116E40D}" destId="{A6F6C4F5-0E73-4D96-ADA6-B17CCFE09FCF}" srcOrd="0" destOrd="0" presId="urn:microsoft.com/office/officeart/2005/8/layout/hierarchy1"/>
     <dgm:cxn modelId="{F3B6E883-09D4-436D-B364-183391859CAE}" type="presOf" srcId="{4D7DA046-92D8-48DD-B3E2-6A3CB704EEA2}" destId="{21077167-5E85-46CE-96E2-17957D918597}" srcOrd="0" destOrd="0" presId="urn:microsoft.com/office/officeart/2005/8/layout/hierarchy1"/>
+    <dgm:cxn modelId="{CF534D86-953D-42D5-82FF-3C03FBAE9C5C}" type="presOf" srcId="{852E708E-E59E-466E-BCCE-D775428703A2}" destId="{EABC2E14-4834-4844-ADCF-8D2CAE420D7B}" srcOrd="0" destOrd="0" presId="urn:microsoft.com/office/officeart/2005/8/layout/hierarchy1"/>
     <dgm:cxn modelId="{E8D29F8B-FE87-4254-BD40-2B7B3C84EE1E}" type="presOf" srcId="{62DC5DB8-2A8E-4669-A7B4-1292FBB7EF96}" destId="{A5FA6E6B-BC7E-46D7-9019-D27F3D5F576F}" srcOrd="0" destOrd="0" presId="urn:microsoft.com/office/officeart/2005/8/layout/hierarchy1"/>
-    <dgm:cxn modelId="{7D278E8C-50E0-4E58-9B2C-8A39314D0E7F}" srcId="{669BC9A0-B2B3-4D13-B541-8EB8DA088DBB}" destId="{8F74700D-6B63-418B-B3FC-D412EBEF9512}" srcOrd="4" destOrd="0" parTransId="{2BEE67C3-65C1-49BB-A00F-136894D14E74}" sibTransId="{18DA79EE-806A-4EF8-A6FC-88A73F9DACC9}"/>
+    <dgm:cxn modelId="{1698278C-29B6-43DC-A738-C0A6A7ECE798}" type="presOf" srcId="{2BEE67C3-65C1-49BB-A00F-136894D14E74}" destId="{D2297475-3E0F-4C09-8849-306450C68434}" srcOrd="0" destOrd="0" presId="urn:microsoft.com/office/officeart/2005/8/layout/hierarchy1"/>
+    <dgm:cxn modelId="{7D278E8C-50E0-4E58-9B2C-8A39314D0E7F}" srcId="{669BC9A0-B2B3-4D13-B541-8EB8DA088DBB}" destId="{8F74700D-6B63-418B-B3FC-D412EBEF9512}" srcOrd="3" destOrd="0" parTransId="{2BEE67C3-65C1-49BB-A00F-136894D14E74}" sibTransId="{18DA79EE-806A-4EF8-A6FC-88A73F9DACC9}"/>
     <dgm:cxn modelId="{EAE0B591-3306-4627-8396-3559A723CC6D}" type="presOf" srcId="{669BC9A0-B2B3-4D13-B541-8EB8DA088DBB}" destId="{4A8CBAFA-FF53-4BB4-A5FF-D9E3781B3B1B}" srcOrd="0" destOrd="0" presId="urn:microsoft.com/office/officeart/2005/8/layout/hierarchy1"/>
     <dgm:cxn modelId="{B460F7A8-D6CF-492A-A2C5-FEA53B3A1DE5}" type="presOf" srcId="{0BB689BB-F006-4831-914E-4070CD6A639A}" destId="{369C72AF-1E4C-49D3-A6F3-6AE1571AEA6D}" srcOrd="0" destOrd="0" presId="urn:microsoft.com/office/officeart/2005/8/layout/hierarchy1"/>
+    <dgm:cxn modelId="{A6D837AA-0EA9-47D4-865B-18DB61E085BF}" type="presOf" srcId="{E36E70FE-67E8-4496-ABF5-A4CAD18EA4B2}" destId="{2F1DC9E2-3989-4D02-8C6B-4F714375E318}" srcOrd="0" destOrd="0" presId="urn:microsoft.com/office/officeart/2005/8/layout/hierarchy1"/>
     <dgm:cxn modelId="{074A6EB1-0687-4FAE-95A0-C0B582D74E0C}" type="presOf" srcId="{3E5F0B38-6BAD-4C8A-AC50-464969E9669A}" destId="{5B388A4D-036F-4066-BBFB-C947D45D276A}" srcOrd="0" destOrd="0" presId="urn:microsoft.com/office/officeart/2005/8/layout/hierarchy1"/>
     <dgm:cxn modelId="{F8BD89B4-41B4-44A6-A5AC-7CE4966940E4}" srcId="{6550B864-F475-4D4B-AF95-40616CFF7B34}" destId="{669BC9A0-B2B3-4D13-B541-8EB8DA088DBB}" srcOrd="0" destOrd="0" parTransId="{D355EF91-1FEE-47A9-B77D-08D09E9964C8}" sibTransId="{89EB819A-4CDE-44A0-A816-DE01FFD79FEB}"/>
-    <dgm:cxn modelId="{4A3EA4C3-26AD-4F14-B86E-7A613E81500A}" type="presOf" srcId="{F4257952-D032-492B-A69C-ECE69D2FA3CE}" destId="{26D480A3-7576-43E3-A933-0D6272033705}" srcOrd="0" destOrd="0" presId="urn:microsoft.com/office/officeart/2005/8/layout/hierarchy1"/>
+    <dgm:cxn modelId="{816E90B7-678F-4B30-A890-9844109A8EAF}" type="presOf" srcId="{9ABB4123-E535-4E3F-8CB4-BBCBE93D6093}" destId="{CA041F28-29CF-4632-AF3F-8B93F93362DE}" srcOrd="0" destOrd="0" presId="urn:microsoft.com/office/officeart/2005/8/layout/hierarchy1"/>
+    <dgm:cxn modelId="{AE8F09C0-BE86-4DE9-AEC0-A73F6226795A}" type="presOf" srcId="{1E116DF0-D99B-4A80-933C-4783FE18EF65}" destId="{D5579671-A2DC-4EE7-BF89-BAF9484F892F}" srcOrd="0" destOrd="0" presId="urn:microsoft.com/office/officeart/2005/8/layout/hierarchy1"/>
+    <dgm:cxn modelId="{CED8A3C0-508D-44BA-8810-343327B0D3BA}" type="presOf" srcId="{B761BCB4-B5AF-4FDB-8C72-650ADB81B67D}" destId="{166D3F28-A84D-46C3-A0DA-B2C2351FE975}" srcOrd="0" destOrd="0" presId="urn:microsoft.com/office/officeart/2005/8/layout/hierarchy1"/>
+    <dgm:cxn modelId="{21B375CE-DB10-42A6-B6DE-BBEF5E4E3902}" srcId="{8F74700D-6B63-418B-B3FC-D412EBEF9512}" destId="{E36E70FE-67E8-4496-ABF5-A4CAD18EA4B2}" srcOrd="2" destOrd="0" parTransId="{9ABB4123-E535-4E3F-8CB4-BBCBE93D6093}" sibTransId="{4BCF421B-7DCE-4B1F-B080-101F558DCE5C}"/>
+    <dgm:cxn modelId="{B6AF5AD1-2B58-43BE-8484-6D1E7BE8D48A}" type="presOf" srcId="{F7011F9B-7EA4-4DE1-B5D0-84B0DFD92BC8}" destId="{74D8FE33-3EE2-44C7-923F-A1AA6E48FD3E}" srcOrd="0" destOrd="0" presId="urn:microsoft.com/office/officeart/2005/8/layout/hierarchy1"/>
     <dgm:cxn modelId="{23FDBED1-1E8F-492C-AF9D-B9B13E1E4343}" type="presOf" srcId="{6550B864-F475-4D4B-AF95-40616CFF7B34}" destId="{376B0564-B1E6-4D9C-8CF6-8AE7C9AE6A14}" srcOrd="0" destOrd="0" presId="urn:microsoft.com/office/officeart/2005/8/layout/hierarchy1"/>
     <dgm:cxn modelId="{3A2D90D9-95BD-476E-B5FF-1A7E61B3051F}" type="presOf" srcId="{F3CCBC27-70C9-4FAA-B187-7399575AC688}" destId="{5AFE67C6-4CA5-4EEC-BE7E-2653985296FD}" srcOrd="0" destOrd="0" presId="urn:microsoft.com/office/officeart/2005/8/layout/hierarchy1"/>
-    <dgm:cxn modelId="{133FA7DB-0DC7-4DD1-9976-94B6D3962B50}" type="presOf" srcId="{2BEE67C3-65C1-49BB-A00F-136894D14E74}" destId="{BA765BEA-4CE8-45C8-BAC2-9870E912E7FC}" srcOrd="0" destOrd="0" presId="urn:microsoft.com/office/officeart/2005/8/layout/hierarchy1"/>
-    <dgm:cxn modelId="{51981DFA-2F6B-43AF-B2A4-9A756CCFA686}" srcId="{669BC9A0-B2B3-4D13-B541-8EB8DA088DBB}" destId="{4D7DA046-92D8-48DD-B3E2-6A3CB704EEA2}" srcOrd="3" destOrd="0" parTransId="{3E5F0B38-6BAD-4C8A-AC50-464969E9669A}" sibTransId="{9E14623A-2D9D-462D-A3D2-8DCC6811F06D}"/>
+    <dgm:cxn modelId="{7452B3E9-3801-443E-93C9-DF855B9AC23A}" srcId="{8F74700D-6B63-418B-B3FC-D412EBEF9512}" destId="{B761BCB4-B5AF-4FDB-8C72-650ADB81B67D}" srcOrd="0" destOrd="0" parTransId="{852E708E-E59E-466E-BCCE-D775428703A2}" sibTransId="{0DFE344B-FC2A-4CB8-A7E0-6CDBF7F43F3C}"/>
+    <dgm:cxn modelId="{19BC33F6-89FE-434C-8116-85E7151DD72F}" srcId="{8F74700D-6B63-418B-B3FC-D412EBEF9512}" destId="{F7011F9B-7EA4-4DE1-B5D0-84B0DFD92BC8}" srcOrd="1" destOrd="0" parTransId="{1E116DF0-D99B-4A80-933C-4783FE18EF65}" sibTransId="{F7275817-76AE-472F-A278-92A7CEDD8515}"/>
+    <dgm:cxn modelId="{51981DFA-2F6B-43AF-B2A4-9A756CCFA686}" srcId="{669BC9A0-B2B3-4D13-B541-8EB8DA088DBB}" destId="{4D7DA046-92D8-48DD-B3E2-6A3CB704EEA2}" srcOrd="2" destOrd="0" parTransId="{3E5F0B38-6BAD-4C8A-AC50-464969E9669A}" sibTransId="{9E14623A-2D9D-462D-A3D2-8DCC6811F06D}"/>
     <dgm:cxn modelId="{E64A1EFD-A0A2-4613-931B-20496F6A7C0D}" type="presParOf" srcId="{376B0564-B1E6-4D9C-8CF6-8AE7C9AE6A14}" destId="{332CABA6-A827-471E-87E7-05972BD8A552}" srcOrd="0" destOrd="0" presId="urn:microsoft.com/office/officeart/2005/8/layout/hierarchy1"/>
     <dgm:cxn modelId="{E6690578-DB11-4D92-A012-6078C7F704B2}" type="presParOf" srcId="{332CABA6-A827-471E-87E7-05972BD8A552}" destId="{934D84B9-1817-434A-80AD-01297CC7DC82}" srcOrd="0" destOrd="0" presId="urn:microsoft.com/office/officeart/2005/8/layout/hierarchy1"/>
     <dgm:cxn modelId="{50930E60-71A6-45A3-B7DE-0B8BBFE63F43}" type="presParOf" srcId="{934D84B9-1817-434A-80AD-01297CC7DC82}" destId="{0FC0FAC0-735F-4377-9113-E709B8B51419}" srcOrd="0" destOrd="0" presId="urn:microsoft.com/office/officeart/2005/8/layout/hierarchy1"/>
     <dgm:cxn modelId="{9F5627E0-4161-4AB8-9AF5-9A5EE01C6908}" type="presParOf" srcId="{934D84B9-1817-434A-80AD-01297CC7DC82}" destId="{4A8CBAFA-FF53-4BB4-A5FF-D9E3781B3B1B}" srcOrd="1" destOrd="0" presId="urn:microsoft.com/office/officeart/2005/8/layout/hierarchy1"/>
     <dgm:cxn modelId="{90A5C7D6-0378-4ACB-99D6-F91A017078E4}" type="presParOf" srcId="{332CABA6-A827-471E-87E7-05972BD8A552}" destId="{02E07299-D638-4A4F-92CF-6A376282B30B}" srcOrd="1" destOrd="0" presId="urn:microsoft.com/office/officeart/2005/8/layout/hierarchy1"/>
-    <dgm:cxn modelId="{327CF0ED-70B5-479E-97FD-30969094E4FE}" type="presParOf" srcId="{02E07299-D638-4A4F-92CF-6A376282B30B}" destId="{1B3D64C7-8B03-4B70-B09D-06731EADEE92}" srcOrd="0" destOrd="0" presId="urn:microsoft.com/office/officeart/2005/8/layout/hierarchy1"/>
-    <dgm:cxn modelId="{87F7C3AC-0061-4D42-BF80-6DEC22710E9B}" type="presParOf" srcId="{02E07299-D638-4A4F-92CF-6A376282B30B}" destId="{C8110DC6-C185-40DA-8F1D-5C05C6C4026D}" srcOrd="1" destOrd="0" presId="urn:microsoft.com/office/officeart/2005/8/layout/hierarchy1"/>
-    <dgm:cxn modelId="{081AAE54-1453-4742-A55F-9972AA964FC7}" type="presParOf" srcId="{C8110DC6-C185-40DA-8F1D-5C05C6C4026D}" destId="{C4E21DDE-CAB2-46A9-9DEC-01BCE1546F27}" srcOrd="0" destOrd="0" presId="urn:microsoft.com/office/officeart/2005/8/layout/hierarchy1"/>
-    <dgm:cxn modelId="{09DC750A-ACC7-404A-874F-1A7CDDE88D3B}" type="presParOf" srcId="{C4E21DDE-CAB2-46A9-9DEC-01BCE1546F27}" destId="{342E2BCF-39E2-442D-9250-3A8B0DCE8AD5}" srcOrd="0" destOrd="0" presId="urn:microsoft.com/office/officeart/2005/8/layout/hierarchy1"/>
-    <dgm:cxn modelId="{2EC6CFF3-F844-46D9-98D6-EEF3BD8202CF}" type="presParOf" srcId="{C4E21DDE-CAB2-46A9-9DEC-01BCE1546F27}" destId="{26D480A3-7576-43E3-A933-0D6272033705}" srcOrd="1" destOrd="0" presId="urn:microsoft.com/office/officeart/2005/8/layout/hierarchy1"/>
-    <dgm:cxn modelId="{FADAB650-663F-42A1-83F5-28C56E4A8FB9}" type="presParOf" srcId="{C8110DC6-C185-40DA-8F1D-5C05C6C4026D}" destId="{2FEDB332-2426-4870-B549-DC65831E59A4}" srcOrd="1" destOrd="0" presId="urn:microsoft.com/office/officeart/2005/8/layout/hierarchy1"/>
-    <dgm:cxn modelId="{E182661F-537F-4A89-83B5-4F2871B1B6D9}" type="presParOf" srcId="{02E07299-D638-4A4F-92CF-6A376282B30B}" destId="{A6F6C4F5-0E73-4D96-ADA6-B17CCFE09FCF}" srcOrd="2" destOrd="0" presId="urn:microsoft.com/office/officeart/2005/8/layout/hierarchy1"/>
-    <dgm:cxn modelId="{C27BC620-61E8-452B-A39F-DD3B7161B6EA}" type="presParOf" srcId="{02E07299-D638-4A4F-92CF-6A376282B30B}" destId="{E9AB1FFB-8A62-4863-BF36-82199CC14DDA}" srcOrd="3" destOrd="0" presId="urn:microsoft.com/office/officeart/2005/8/layout/hierarchy1"/>
+    <dgm:cxn modelId="{E182661F-537F-4A89-83B5-4F2871B1B6D9}" type="presParOf" srcId="{02E07299-D638-4A4F-92CF-6A376282B30B}" destId="{A6F6C4F5-0E73-4D96-ADA6-B17CCFE09FCF}" srcOrd="0" destOrd="0" presId="urn:microsoft.com/office/officeart/2005/8/layout/hierarchy1"/>
+    <dgm:cxn modelId="{C27BC620-61E8-452B-A39F-DD3B7161B6EA}" type="presParOf" srcId="{02E07299-D638-4A4F-92CF-6A376282B30B}" destId="{E9AB1FFB-8A62-4863-BF36-82199CC14DDA}" srcOrd="1" destOrd="0" presId="urn:microsoft.com/office/officeart/2005/8/layout/hierarchy1"/>
     <dgm:cxn modelId="{88BFBCE5-74B6-43E8-AEDC-4EEC5209219F}" type="presParOf" srcId="{E9AB1FFB-8A62-4863-BF36-82199CC14DDA}" destId="{12826816-52EA-43CC-867F-3373CAA44C47}" srcOrd="0" destOrd="0" presId="urn:microsoft.com/office/officeart/2005/8/layout/hierarchy1"/>
     <dgm:cxn modelId="{1656D154-7149-455F-80F5-B17D5DA8A14C}" type="presParOf" srcId="{12826816-52EA-43CC-867F-3373CAA44C47}" destId="{F142D87D-864D-47D7-95D9-3D98B6F4C119}" srcOrd="0" destOrd="0" presId="urn:microsoft.com/office/officeart/2005/8/layout/hierarchy1"/>
     <dgm:cxn modelId="{5FBD2C61-D560-44A2-96AD-E2A58880497A}" type="presParOf" srcId="{12826816-52EA-43CC-867F-3373CAA44C47}" destId="{5AFE67C6-4CA5-4EEC-BE7E-2653985296FD}" srcOrd="1" destOrd="0" presId="urn:microsoft.com/office/officeart/2005/8/layout/hierarchy1"/>
     <dgm:cxn modelId="{5AD59F4F-041A-4C9D-978C-2C6119177A9B}" type="presParOf" srcId="{E9AB1FFB-8A62-4863-BF36-82199CC14DDA}" destId="{3F43B404-A193-4DC8-BA8F-B8B605E0FD4C}" srcOrd="1" destOrd="0" presId="urn:microsoft.com/office/officeart/2005/8/layout/hierarchy1"/>
-    <dgm:cxn modelId="{B154969C-19E1-4082-AC20-C623F0EB6E95}" type="presParOf" srcId="{02E07299-D638-4A4F-92CF-6A376282B30B}" destId="{A5FA6E6B-BC7E-46D7-9019-D27F3D5F576F}" srcOrd="4" destOrd="0" presId="urn:microsoft.com/office/officeart/2005/8/layout/hierarchy1"/>
-    <dgm:cxn modelId="{973D3EB2-4FC4-4E50-8504-39D10FE250C5}" type="presParOf" srcId="{02E07299-D638-4A4F-92CF-6A376282B30B}" destId="{89222010-A974-4D3C-B6E8-AF89C1AC11A4}" srcOrd="5" destOrd="0" presId="urn:microsoft.com/office/officeart/2005/8/layout/hierarchy1"/>
+    <dgm:cxn modelId="{B154969C-19E1-4082-AC20-C623F0EB6E95}" type="presParOf" srcId="{02E07299-D638-4A4F-92CF-6A376282B30B}" destId="{A5FA6E6B-BC7E-46D7-9019-D27F3D5F576F}" srcOrd="2" destOrd="0" presId="urn:microsoft.com/office/officeart/2005/8/layout/hierarchy1"/>
+    <dgm:cxn modelId="{973D3EB2-4FC4-4E50-8504-39D10FE250C5}" type="presParOf" srcId="{02E07299-D638-4A4F-92CF-6A376282B30B}" destId="{89222010-A974-4D3C-B6E8-AF89C1AC11A4}" srcOrd="3" destOrd="0" presId="urn:microsoft.com/office/officeart/2005/8/layout/hierarchy1"/>
     <dgm:cxn modelId="{335A82F5-5C21-4E29-9882-5A17E9BE3D0D}" type="presParOf" srcId="{89222010-A974-4D3C-B6E8-AF89C1AC11A4}" destId="{47C2E89A-E581-4A4A-863B-E35260C9AAFD}" srcOrd="0" destOrd="0" presId="urn:microsoft.com/office/officeart/2005/8/layout/hierarchy1"/>
     <dgm:cxn modelId="{3A738563-16F2-4E0C-B7CB-CF55CAD7A959}" type="presParOf" srcId="{47C2E89A-E581-4A4A-863B-E35260C9AAFD}" destId="{F08448E1-306A-42C4-BD47-5D4373884F88}" srcOrd="0" destOrd="0" presId="urn:microsoft.com/office/officeart/2005/8/layout/hierarchy1"/>
     <dgm:cxn modelId="{5F148F1E-8769-4430-BAE8-6073DBFBD350}" type="presParOf" srcId="{47C2E89A-E581-4A4A-863B-E35260C9AAFD}" destId="{369C72AF-1E4C-49D3-A6F3-6AE1571AEA6D}" srcOrd="1" destOrd="0" presId="urn:microsoft.com/office/officeart/2005/8/layout/hierarchy1"/>
     <dgm:cxn modelId="{C4DCBAFE-5861-4419-9BDA-5EC7FB1E2DC5}" type="presParOf" srcId="{89222010-A974-4D3C-B6E8-AF89C1AC11A4}" destId="{9A1E042C-A16B-4C8F-ABAA-38922755E197}" srcOrd="1" destOrd="0" presId="urn:microsoft.com/office/officeart/2005/8/layout/hierarchy1"/>
-    <dgm:cxn modelId="{CDA2FADA-FF21-4C93-86AF-AAA4A172B058}" type="presParOf" srcId="{02E07299-D638-4A4F-92CF-6A376282B30B}" destId="{5B388A4D-036F-4066-BBFB-C947D45D276A}" srcOrd="6" destOrd="0" presId="urn:microsoft.com/office/officeart/2005/8/layout/hierarchy1"/>
-    <dgm:cxn modelId="{6348162E-EDDD-43F6-9536-BDD899AA7947}" type="presParOf" srcId="{02E07299-D638-4A4F-92CF-6A376282B30B}" destId="{A9822B2D-EA55-4E11-B686-74B074AAFD2E}" srcOrd="7" destOrd="0" presId="urn:microsoft.com/office/officeart/2005/8/layout/hierarchy1"/>
+    <dgm:cxn modelId="{CDA2FADA-FF21-4C93-86AF-AAA4A172B058}" type="presParOf" srcId="{02E07299-D638-4A4F-92CF-6A376282B30B}" destId="{5B388A4D-036F-4066-BBFB-C947D45D276A}" srcOrd="4" destOrd="0" presId="urn:microsoft.com/office/officeart/2005/8/layout/hierarchy1"/>
+    <dgm:cxn modelId="{6348162E-EDDD-43F6-9536-BDD899AA7947}" type="presParOf" srcId="{02E07299-D638-4A4F-92CF-6A376282B30B}" destId="{A9822B2D-EA55-4E11-B686-74B074AAFD2E}" srcOrd="5" destOrd="0" presId="urn:microsoft.com/office/officeart/2005/8/layout/hierarchy1"/>
     <dgm:cxn modelId="{4F033143-F6A5-4EA3-9C3E-23BFFFCD2303}" type="presParOf" srcId="{A9822B2D-EA55-4E11-B686-74B074AAFD2E}" destId="{3F95358B-97FD-4B42-87D2-1B2D8B30C20C}" srcOrd="0" destOrd="0" presId="urn:microsoft.com/office/officeart/2005/8/layout/hierarchy1"/>
     <dgm:cxn modelId="{B48BA279-047E-49F5-BCEC-E0C2CBE72102}" type="presParOf" srcId="{3F95358B-97FD-4B42-87D2-1B2D8B30C20C}" destId="{D181B7E1-F142-4855-BF32-6B99A157D5B7}" srcOrd="0" destOrd="0" presId="urn:microsoft.com/office/officeart/2005/8/layout/hierarchy1"/>
     <dgm:cxn modelId="{1597ADB0-59F7-4496-AA4F-9DE4AFEADBDF}" type="presParOf" srcId="{3F95358B-97FD-4B42-87D2-1B2D8B30C20C}" destId="{21077167-5E85-46CE-96E2-17957D918597}" srcOrd="1" destOrd="0" presId="urn:microsoft.com/office/officeart/2005/8/layout/hierarchy1"/>
     <dgm:cxn modelId="{A4FAA3C0-B112-472D-96C6-59900677DF48}" type="presParOf" srcId="{A9822B2D-EA55-4E11-B686-74B074AAFD2E}" destId="{C3BFF7F3-0193-4B00-ADE6-8D555AD6C6CA}" srcOrd="1" destOrd="0" presId="urn:microsoft.com/office/officeart/2005/8/layout/hierarchy1"/>
-    <dgm:cxn modelId="{0AE3C574-BB10-49FC-AD75-E2AE0B303CCC}" type="presParOf" srcId="{02E07299-D638-4A4F-92CF-6A376282B30B}" destId="{BA765BEA-4CE8-45C8-BAC2-9870E912E7FC}" srcOrd="8" destOrd="0" presId="urn:microsoft.com/office/officeart/2005/8/layout/hierarchy1"/>
-    <dgm:cxn modelId="{7451326D-A242-4B96-8E80-05505648431E}" type="presParOf" srcId="{02E07299-D638-4A4F-92CF-6A376282B30B}" destId="{B6BE4B8D-E6C1-449D-B0B7-EFAA0B01F4D8}" srcOrd="9" destOrd="0" presId="urn:microsoft.com/office/officeart/2005/8/layout/hierarchy1"/>
-    <dgm:cxn modelId="{9DE4389C-4D19-4A1E-8B30-E066932A9BC9}" type="presParOf" srcId="{B6BE4B8D-E6C1-449D-B0B7-EFAA0B01F4D8}" destId="{D3F07459-A75B-4608-A30B-A5B819EAAD6A}" srcOrd="0" destOrd="0" presId="urn:microsoft.com/office/officeart/2005/8/layout/hierarchy1"/>
-    <dgm:cxn modelId="{DC2E0CC2-83C0-4D58-BFB0-3FE9BC38AF24}" type="presParOf" srcId="{D3F07459-A75B-4608-A30B-A5B819EAAD6A}" destId="{AA6E0DDA-D889-44AF-BBD0-D61FF7156885}" srcOrd="0" destOrd="0" presId="urn:microsoft.com/office/officeart/2005/8/layout/hierarchy1"/>
-    <dgm:cxn modelId="{C46F6DDA-0400-40A3-84F8-97243082D184}" type="presParOf" srcId="{D3F07459-A75B-4608-A30B-A5B819EAAD6A}" destId="{70893F41-43BD-430E-B0DB-F10C9F9F04A9}" srcOrd="1" destOrd="0" presId="urn:microsoft.com/office/officeart/2005/8/layout/hierarchy1"/>
-    <dgm:cxn modelId="{39633F37-58CC-48E7-8E5F-505C56905D99}" type="presParOf" srcId="{B6BE4B8D-E6C1-449D-B0B7-EFAA0B01F4D8}" destId="{834BF605-342F-4FCD-A8D2-78967B5085AE}" srcOrd="1" destOrd="0" presId="urn:microsoft.com/office/officeart/2005/8/layout/hierarchy1"/>
+    <dgm:cxn modelId="{42E9D97B-A614-4465-B6C8-56F74EB8D14B}" type="presParOf" srcId="{02E07299-D638-4A4F-92CF-6A376282B30B}" destId="{D2297475-3E0F-4C09-8849-306450C68434}" srcOrd="6" destOrd="0" presId="urn:microsoft.com/office/officeart/2005/8/layout/hierarchy1"/>
+    <dgm:cxn modelId="{122E6DCE-CFA5-4266-B829-98CD127A7F23}" type="presParOf" srcId="{02E07299-D638-4A4F-92CF-6A376282B30B}" destId="{B693BC37-3480-411E-9CCE-3E29ED18D9EF}" srcOrd="7" destOrd="0" presId="urn:microsoft.com/office/officeart/2005/8/layout/hierarchy1"/>
+    <dgm:cxn modelId="{8A581B66-F9B1-4B53-B5C5-66530B13CD9B}" type="presParOf" srcId="{B693BC37-3480-411E-9CCE-3E29ED18D9EF}" destId="{34D67B9B-509A-4533-A8C1-05BBFE56C7CC}" srcOrd="0" destOrd="0" presId="urn:microsoft.com/office/officeart/2005/8/layout/hierarchy1"/>
+    <dgm:cxn modelId="{1928CA15-C117-4B30-A553-B23C48507C13}" type="presParOf" srcId="{34D67B9B-509A-4533-A8C1-05BBFE56C7CC}" destId="{D233D6D2-054F-48E7-8C44-C0FD9A30C172}" srcOrd="0" destOrd="0" presId="urn:microsoft.com/office/officeart/2005/8/layout/hierarchy1"/>
+    <dgm:cxn modelId="{68134BA0-958E-4FA1-8230-6FAB9B681B23}" type="presParOf" srcId="{34D67B9B-509A-4533-A8C1-05BBFE56C7CC}" destId="{27C4145F-0850-4FE2-82D8-463685F5081F}" srcOrd="1" destOrd="0" presId="urn:microsoft.com/office/officeart/2005/8/layout/hierarchy1"/>
+    <dgm:cxn modelId="{F9CEE3B6-5FEF-4E2F-811B-CCB1BAB7F856}" type="presParOf" srcId="{B693BC37-3480-411E-9CCE-3E29ED18D9EF}" destId="{17A8E2FA-173A-4B33-8187-31F3C191A048}" srcOrd="1" destOrd="0" presId="urn:microsoft.com/office/officeart/2005/8/layout/hierarchy1"/>
+    <dgm:cxn modelId="{37EBD5EC-E54B-4FA4-ACA8-CC47C51B0708}" type="presParOf" srcId="{17A8E2FA-173A-4B33-8187-31F3C191A048}" destId="{EABC2E14-4834-4844-ADCF-8D2CAE420D7B}" srcOrd="0" destOrd="0" presId="urn:microsoft.com/office/officeart/2005/8/layout/hierarchy1"/>
+    <dgm:cxn modelId="{316E16D5-D95F-4B92-B78C-5638839B6E6C}" type="presParOf" srcId="{17A8E2FA-173A-4B33-8187-31F3C191A048}" destId="{A8B05336-5BC0-4D69-8191-085163287556}" srcOrd="1" destOrd="0" presId="urn:microsoft.com/office/officeart/2005/8/layout/hierarchy1"/>
+    <dgm:cxn modelId="{562442E3-4F10-46BB-9437-9DAC075343E4}" type="presParOf" srcId="{A8B05336-5BC0-4D69-8191-085163287556}" destId="{FFE32ED9-747F-4E10-9688-F0A292CADDE5}" srcOrd="0" destOrd="0" presId="urn:microsoft.com/office/officeart/2005/8/layout/hierarchy1"/>
+    <dgm:cxn modelId="{FF5B74D8-23EC-4316-88C0-793DAE0D95CD}" type="presParOf" srcId="{FFE32ED9-747F-4E10-9688-F0A292CADDE5}" destId="{DB80E178-DDA6-4A8F-B88C-E9B43EB86991}" srcOrd="0" destOrd="0" presId="urn:microsoft.com/office/officeart/2005/8/layout/hierarchy1"/>
+    <dgm:cxn modelId="{8A0DF322-CB2A-465B-BD04-E8D44A244D32}" type="presParOf" srcId="{FFE32ED9-747F-4E10-9688-F0A292CADDE5}" destId="{166D3F28-A84D-46C3-A0DA-B2C2351FE975}" srcOrd="1" destOrd="0" presId="urn:microsoft.com/office/officeart/2005/8/layout/hierarchy1"/>
+    <dgm:cxn modelId="{DB27D93B-1BC7-4F89-9441-3F2963B7AFE2}" type="presParOf" srcId="{A8B05336-5BC0-4D69-8191-085163287556}" destId="{DBBD6D74-8B39-4193-884F-4392181B9D45}" srcOrd="1" destOrd="0" presId="urn:microsoft.com/office/officeart/2005/8/layout/hierarchy1"/>
+    <dgm:cxn modelId="{3D784D0F-0E79-4F95-BBC2-B1A2650C3CBF}" type="presParOf" srcId="{17A8E2FA-173A-4B33-8187-31F3C191A048}" destId="{D5579671-A2DC-4EE7-BF89-BAF9484F892F}" srcOrd="2" destOrd="0" presId="urn:microsoft.com/office/officeart/2005/8/layout/hierarchy1"/>
+    <dgm:cxn modelId="{2534BF7F-166E-41C4-A9E9-585072850805}" type="presParOf" srcId="{17A8E2FA-173A-4B33-8187-31F3C191A048}" destId="{06210B39-36B8-4536-A6AC-BA4F9974B3AD}" srcOrd="3" destOrd="0" presId="urn:microsoft.com/office/officeart/2005/8/layout/hierarchy1"/>
+    <dgm:cxn modelId="{73F04CFD-1D39-48F8-A1B2-5EE42540E816}" type="presParOf" srcId="{06210B39-36B8-4536-A6AC-BA4F9974B3AD}" destId="{7E4A2007-5FD0-4E74-B87C-A93CAA392A80}" srcOrd="0" destOrd="0" presId="urn:microsoft.com/office/officeart/2005/8/layout/hierarchy1"/>
+    <dgm:cxn modelId="{E2FAD116-B9C9-426C-8AC3-D1B1A4092DFA}" type="presParOf" srcId="{7E4A2007-5FD0-4E74-B87C-A93CAA392A80}" destId="{71264332-18D3-4467-A50C-098BA6A39018}" srcOrd="0" destOrd="0" presId="urn:microsoft.com/office/officeart/2005/8/layout/hierarchy1"/>
+    <dgm:cxn modelId="{D2EDA4AC-E35F-4390-83DD-A8BF67AA990D}" type="presParOf" srcId="{7E4A2007-5FD0-4E74-B87C-A93CAA392A80}" destId="{74D8FE33-3EE2-44C7-923F-A1AA6E48FD3E}" srcOrd="1" destOrd="0" presId="urn:microsoft.com/office/officeart/2005/8/layout/hierarchy1"/>
+    <dgm:cxn modelId="{B12FEBC0-93EF-44D3-ADF5-D3B893B1D473}" type="presParOf" srcId="{06210B39-36B8-4536-A6AC-BA4F9974B3AD}" destId="{F946B448-6A5D-48E6-8E02-A285D6CF328D}" srcOrd="1" destOrd="0" presId="urn:microsoft.com/office/officeart/2005/8/layout/hierarchy1"/>
+    <dgm:cxn modelId="{D6C23E6F-2BFD-4273-99BC-AE49494D85FA}" type="presParOf" srcId="{17A8E2FA-173A-4B33-8187-31F3C191A048}" destId="{CA041F28-29CF-4632-AF3F-8B93F93362DE}" srcOrd="4" destOrd="0" presId="urn:microsoft.com/office/officeart/2005/8/layout/hierarchy1"/>
+    <dgm:cxn modelId="{3AD5AEA0-91F0-4D3F-A4E0-8AFD7D94F2C4}" type="presParOf" srcId="{17A8E2FA-173A-4B33-8187-31F3C191A048}" destId="{9E39DF17-389F-4765-A629-1247FE541928}" srcOrd="5" destOrd="0" presId="urn:microsoft.com/office/officeart/2005/8/layout/hierarchy1"/>
+    <dgm:cxn modelId="{C84842A9-FE93-46EF-96D9-E07CD3278B06}" type="presParOf" srcId="{9E39DF17-389F-4765-A629-1247FE541928}" destId="{866E06AE-8A23-48F8-8365-80CC1E33112B}" srcOrd="0" destOrd="0" presId="urn:microsoft.com/office/officeart/2005/8/layout/hierarchy1"/>
+    <dgm:cxn modelId="{FFBBD7F2-F369-4A90-80F4-993E96B1C311}" type="presParOf" srcId="{866E06AE-8A23-48F8-8365-80CC1E33112B}" destId="{8CB573EC-A82F-4E7C-B633-A38BF714D7B9}" srcOrd="0" destOrd="0" presId="urn:microsoft.com/office/officeart/2005/8/layout/hierarchy1"/>
+    <dgm:cxn modelId="{F9DE7563-2882-4B12-AD37-DD5F93DFECEA}" type="presParOf" srcId="{866E06AE-8A23-48F8-8365-80CC1E33112B}" destId="{2F1DC9E2-3989-4D02-8C6B-4F714375E318}" srcOrd="1" destOrd="0" presId="urn:microsoft.com/office/officeart/2005/8/layout/hierarchy1"/>
+    <dgm:cxn modelId="{3AD2AADC-0569-4513-9CE6-05EA65E566F6}" type="presParOf" srcId="{9E39DF17-389F-4765-A629-1247FE541928}" destId="{6D77C42C-785F-416B-AEEE-0125B7DC208C}" srcOrd="1" destOrd="0" presId="urn:microsoft.com/office/officeart/2005/8/layout/hierarchy1"/>
   </dgm:cxnLst>
   <dgm:bg/>
   <dgm:whole/>
@@ -1336,15 +1493,15 @@
       <dsp:cNvGrpSpPr/>
     </dsp:nvGrpSpPr>
     <dsp:grpSpPr/>
-    <dsp:sp modelId="{BA765BEA-4CE8-45C8-BAC2-9870E912E7FC}">
+    <dsp:sp modelId="{CA041F28-29CF-4632-AF3F-8B93F93362DE}">
       <dsp:nvSpPr>
         <dsp:cNvPr id="0" name=""/>
         <dsp:cNvSpPr/>
       </dsp:nvSpPr>
       <dsp:spPr>
         <a:xfrm>
-          <a:off x="3988792" y="2441029"/>
-          <a:ext cx="3309143" cy="393712"/>
+          <a:off x="5643364" y="3067698"/>
+          <a:ext cx="1654571" cy="393712"/>
         </a:xfrm>
         <a:custGeom>
           <a:avLst/>
@@ -1361,10 +1518,190 @@
                 <a:pt x="0" y="268303"/>
               </a:lnTo>
               <a:lnTo>
-                <a:pt x="3309143" y="268303"/>
+                <a:pt x="1654571" y="268303"/>
               </a:lnTo>
               <a:lnTo>
-                <a:pt x="3309143" y="393712"/>
+                <a:pt x="1654571" y="393712"/>
+              </a:lnTo>
+            </a:path>
+          </a:pathLst>
+        </a:custGeom>
+        <a:noFill/>
+        <a:ln w="12700" cap="flat" cmpd="sng" algn="ctr">
+          <a:solidFill>
+            <a:schemeClr val="accent1">
+              <a:shade val="80000"/>
+              <a:hueOff val="0"/>
+              <a:satOff val="0"/>
+              <a:lumOff val="0"/>
+              <a:alphaOff val="0"/>
+            </a:schemeClr>
+          </a:solidFill>
+          <a:prstDash val="solid"/>
+          <a:miter lim="800000"/>
+        </a:ln>
+        <a:effectLst/>
+      </dsp:spPr>
+      <dsp:style>
+        <a:lnRef idx="2">
+          <a:scrgbClr r="0" g="0" b="0"/>
+        </a:lnRef>
+        <a:fillRef idx="0">
+          <a:scrgbClr r="0" g="0" b="0"/>
+        </a:fillRef>
+        <a:effectRef idx="0">
+          <a:scrgbClr r="0" g="0" b="0"/>
+        </a:effectRef>
+        <a:fontRef idx="minor"/>
+      </dsp:style>
+    </dsp:sp>
+    <dsp:sp modelId="{D5579671-A2DC-4EE7-BF89-BAF9484F892F}">
+      <dsp:nvSpPr>
+        <dsp:cNvPr id="0" name=""/>
+        <dsp:cNvSpPr/>
+      </dsp:nvSpPr>
+      <dsp:spPr>
+        <a:xfrm>
+          <a:off x="5597644" y="3067698"/>
+          <a:ext cx="91440" cy="393712"/>
+        </a:xfrm>
+        <a:custGeom>
+          <a:avLst/>
+          <a:gdLst/>
+          <a:ahLst/>
+          <a:cxnLst/>
+          <a:rect l="0" t="0" r="0" b="0"/>
+          <a:pathLst>
+            <a:path>
+              <a:moveTo>
+                <a:pt x="45720" y="0"/>
+              </a:moveTo>
+              <a:lnTo>
+                <a:pt x="45720" y="393712"/>
+              </a:lnTo>
+            </a:path>
+          </a:pathLst>
+        </a:custGeom>
+        <a:noFill/>
+        <a:ln w="12700" cap="flat" cmpd="sng" algn="ctr">
+          <a:solidFill>
+            <a:schemeClr val="accent1">
+              <a:shade val="80000"/>
+              <a:hueOff val="0"/>
+              <a:satOff val="0"/>
+              <a:lumOff val="0"/>
+              <a:alphaOff val="0"/>
+            </a:schemeClr>
+          </a:solidFill>
+          <a:prstDash val="solid"/>
+          <a:miter lim="800000"/>
+        </a:ln>
+        <a:effectLst/>
+      </dsp:spPr>
+      <dsp:style>
+        <a:lnRef idx="2">
+          <a:scrgbClr r="0" g="0" b="0"/>
+        </a:lnRef>
+        <a:fillRef idx="0">
+          <a:scrgbClr r="0" g="0" b="0"/>
+        </a:fillRef>
+        <a:effectRef idx="0">
+          <a:scrgbClr r="0" g="0" b="0"/>
+        </a:effectRef>
+        <a:fontRef idx="minor"/>
+      </dsp:style>
+    </dsp:sp>
+    <dsp:sp modelId="{EABC2E14-4834-4844-ADCF-8D2CAE420D7B}">
+      <dsp:nvSpPr>
+        <dsp:cNvPr id="0" name=""/>
+        <dsp:cNvSpPr/>
+      </dsp:nvSpPr>
+      <dsp:spPr>
+        <a:xfrm>
+          <a:off x="3988792" y="3067698"/>
+          <a:ext cx="1654571" cy="393712"/>
+        </a:xfrm>
+        <a:custGeom>
+          <a:avLst/>
+          <a:gdLst/>
+          <a:ahLst/>
+          <a:cxnLst/>
+          <a:rect l="0" t="0" r="0" b="0"/>
+          <a:pathLst>
+            <a:path>
+              <a:moveTo>
+                <a:pt x="1654571" y="0"/>
+              </a:moveTo>
+              <a:lnTo>
+                <a:pt x="1654571" y="268303"/>
+              </a:lnTo>
+              <a:lnTo>
+                <a:pt x="0" y="268303"/>
+              </a:lnTo>
+              <a:lnTo>
+                <a:pt x="0" y="393712"/>
+              </a:lnTo>
+            </a:path>
+          </a:pathLst>
+        </a:custGeom>
+        <a:noFill/>
+        <a:ln w="12700" cap="flat" cmpd="sng" algn="ctr">
+          <a:solidFill>
+            <a:schemeClr val="accent1">
+              <a:shade val="80000"/>
+              <a:hueOff val="0"/>
+              <a:satOff val="0"/>
+              <a:lumOff val="0"/>
+              <a:alphaOff val="0"/>
+            </a:schemeClr>
+          </a:solidFill>
+          <a:prstDash val="solid"/>
+          <a:miter lim="800000"/>
+        </a:ln>
+        <a:effectLst/>
+      </dsp:spPr>
+      <dsp:style>
+        <a:lnRef idx="2">
+          <a:scrgbClr r="0" g="0" b="0"/>
+        </a:lnRef>
+        <a:fillRef idx="0">
+          <a:scrgbClr r="0" g="0" b="0"/>
+        </a:fillRef>
+        <a:effectRef idx="0">
+          <a:scrgbClr r="0" g="0" b="0"/>
+        </a:effectRef>
+        <a:fontRef idx="minor"/>
+      </dsp:style>
+    </dsp:sp>
+    <dsp:sp modelId="{D2297475-3E0F-4C09-8849-306450C68434}">
+      <dsp:nvSpPr>
+        <dsp:cNvPr id="0" name=""/>
+        <dsp:cNvSpPr/>
+      </dsp:nvSpPr>
+      <dsp:spPr>
+        <a:xfrm>
+          <a:off x="3161506" y="1814360"/>
+          <a:ext cx="2481857" cy="393712"/>
+        </a:xfrm>
+        <a:custGeom>
+          <a:avLst/>
+          <a:gdLst/>
+          <a:ahLst/>
+          <a:cxnLst/>
+          <a:rect l="0" t="0" r="0" b="0"/>
+          <a:pathLst>
+            <a:path>
+              <a:moveTo>
+                <a:pt x="0" y="0"/>
+              </a:moveTo>
+              <a:lnTo>
+                <a:pt x="0" y="268303"/>
+              </a:lnTo>
+              <a:lnTo>
+                <a:pt x="2481857" y="268303"/>
+              </a:lnTo>
+              <a:lnTo>
+                <a:pt x="2481857" y="393712"/>
               </a:lnTo>
             </a:path>
           </a:pathLst>
@@ -1405,8 +1742,8 @@
       </dsp:nvSpPr>
       <dsp:spPr>
         <a:xfrm>
-          <a:off x="3988792" y="2441029"/>
-          <a:ext cx="1654571" cy="393712"/>
+          <a:off x="3161506" y="1814360"/>
+          <a:ext cx="827285" cy="393712"/>
         </a:xfrm>
         <a:custGeom>
           <a:avLst/>
@@ -1423,10 +1760,10 @@
                 <a:pt x="0" y="268303"/>
               </a:lnTo>
               <a:lnTo>
-                <a:pt x="1654571" y="268303"/>
+                <a:pt x="827285" y="268303"/>
               </a:lnTo>
               <a:lnTo>
-                <a:pt x="1654571" y="393712"/>
+                <a:pt x="827285" y="393712"/>
               </a:lnTo>
             </a:path>
           </a:pathLst>
@@ -1467,8 +1804,8 @@
       </dsp:nvSpPr>
       <dsp:spPr>
         <a:xfrm>
-          <a:off x="3943072" y="2441029"/>
-          <a:ext cx="91440" cy="393712"/>
+          <a:off x="2334220" y="1814360"/>
+          <a:ext cx="827285" cy="393712"/>
         </a:xfrm>
         <a:custGeom>
           <a:avLst/>
@@ -1479,10 +1816,16 @@
           <a:pathLst>
             <a:path>
               <a:moveTo>
-                <a:pt x="45720" y="0"/>
+                <a:pt x="827285" y="0"/>
               </a:moveTo>
               <a:lnTo>
-                <a:pt x="45720" y="393712"/>
+                <a:pt x="827285" y="268303"/>
+              </a:lnTo>
+              <a:lnTo>
+                <a:pt x="0" y="268303"/>
+              </a:lnTo>
+              <a:lnTo>
+                <a:pt x="0" y="393712"/>
               </a:lnTo>
             </a:path>
           </a:pathLst>
@@ -1523,8 +1866,8 @@
       </dsp:nvSpPr>
       <dsp:spPr>
         <a:xfrm>
-          <a:off x="2334220" y="2441029"/>
-          <a:ext cx="1654571" cy="393712"/>
+          <a:off x="679648" y="1814360"/>
+          <a:ext cx="2481857" cy="393712"/>
         </a:xfrm>
         <a:custGeom>
           <a:avLst/>
@@ -1535,72 +1878,10 @@
           <a:pathLst>
             <a:path>
               <a:moveTo>
-                <a:pt x="1654571" y="0"/>
+                <a:pt x="2481857" y="0"/>
               </a:moveTo>
               <a:lnTo>
-                <a:pt x="1654571" y="268303"/>
-              </a:lnTo>
-              <a:lnTo>
-                <a:pt x="0" y="268303"/>
-              </a:lnTo>
-              <a:lnTo>
-                <a:pt x="0" y="393712"/>
-              </a:lnTo>
-            </a:path>
-          </a:pathLst>
-        </a:custGeom>
-        <a:noFill/>
-        <a:ln w="12700" cap="flat" cmpd="sng" algn="ctr">
-          <a:solidFill>
-            <a:schemeClr val="accent1">
-              <a:shade val="60000"/>
-              <a:hueOff val="0"/>
-              <a:satOff val="0"/>
-              <a:lumOff val="0"/>
-              <a:alphaOff val="0"/>
-            </a:schemeClr>
-          </a:solidFill>
-          <a:prstDash val="solid"/>
-          <a:miter lim="800000"/>
-        </a:ln>
-        <a:effectLst/>
-      </dsp:spPr>
-      <dsp:style>
-        <a:lnRef idx="2">
-          <a:scrgbClr r="0" g="0" b="0"/>
-        </a:lnRef>
-        <a:fillRef idx="0">
-          <a:scrgbClr r="0" g="0" b="0"/>
-        </a:fillRef>
-        <a:effectRef idx="0">
-          <a:scrgbClr r="0" g="0" b="0"/>
-        </a:effectRef>
-        <a:fontRef idx="minor"/>
-      </dsp:style>
-    </dsp:sp>
-    <dsp:sp modelId="{1B3D64C7-8B03-4B70-B09D-06731EADEE92}">
-      <dsp:nvSpPr>
-        <dsp:cNvPr id="0" name=""/>
-        <dsp:cNvSpPr/>
-      </dsp:nvSpPr>
-      <dsp:spPr>
-        <a:xfrm>
-          <a:off x="679648" y="2441029"/>
-          <a:ext cx="3309143" cy="393712"/>
-        </a:xfrm>
-        <a:custGeom>
-          <a:avLst/>
-          <a:gdLst/>
-          <a:ahLst/>
-          <a:cxnLst/>
-          <a:rect l="0" t="0" r="0" b="0"/>
-          <a:pathLst>
-            <a:path>
-              <a:moveTo>
-                <a:pt x="3309143" y="0"/>
-              </a:moveTo>
-              <a:lnTo>
-                <a:pt x="3309143" y="268303"/>
+                <a:pt x="2481857" y="268303"/>
               </a:lnTo>
               <a:lnTo>
                 <a:pt x="0" y="268303"/>
@@ -1647,7 +1928,7 @@
       </dsp:nvSpPr>
       <dsp:spPr>
         <a:xfrm>
-          <a:off x="3311921" y="1581404"/>
+          <a:off x="2484635" y="954735"/>
           <a:ext cx="1353740" cy="859625"/>
         </a:xfrm>
         <a:prstGeom prst="roundRect">
@@ -1699,7 +1980,7 @@
       </dsp:nvSpPr>
       <dsp:spPr>
         <a:xfrm>
-          <a:off x="3462337" y="1724299"/>
+          <a:off x="2635051" y="1097630"/>
           <a:ext cx="1353740" cy="859625"/>
         </a:xfrm>
         <a:prstGeom prst="roundRect">
@@ -1768,139 +2049,7 @@
         </a:p>
       </dsp:txBody>
       <dsp:txXfrm>
-        <a:off x="3487515" y="1749477"/>
-        <a:ext cx="1303384" cy="809269"/>
-      </dsp:txXfrm>
-    </dsp:sp>
-    <dsp:sp modelId="{342E2BCF-39E2-442D-9250-3A8B0DCE8AD5}">
-      <dsp:nvSpPr>
-        <dsp:cNvPr id="0" name=""/>
-        <dsp:cNvSpPr/>
-      </dsp:nvSpPr>
-      <dsp:spPr>
-        <a:xfrm>
-          <a:off x="2778" y="2834742"/>
-          <a:ext cx="1353740" cy="859625"/>
-        </a:xfrm>
-        <a:prstGeom prst="roundRect">
-          <a:avLst>
-            <a:gd name="adj" fmla="val 10000"/>
-          </a:avLst>
-        </a:prstGeom>
-        <a:solidFill>
-          <a:schemeClr val="accent1">
-            <a:hueOff val="0"/>
-            <a:satOff val="0"/>
-            <a:lumOff val="0"/>
-            <a:alphaOff val="0"/>
-          </a:schemeClr>
-        </a:solidFill>
-        <a:ln w="12700" cap="flat" cmpd="sng" algn="ctr">
-          <a:solidFill>
-            <a:schemeClr val="lt1">
-              <a:hueOff val="0"/>
-              <a:satOff val="0"/>
-              <a:lumOff val="0"/>
-              <a:alphaOff val="0"/>
-            </a:schemeClr>
-          </a:solidFill>
-          <a:prstDash val="solid"/>
-          <a:miter lim="800000"/>
-        </a:ln>
-        <a:effectLst/>
-      </dsp:spPr>
-      <dsp:style>
-        <a:lnRef idx="2">
-          <a:scrgbClr r="0" g="0" b="0"/>
-        </a:lnRef>
-        <a:fillRef idx="1">
-          <a:scrgbClr r="0" g="0" b="0"/>
-        </a:fillRef>
-        <a:effectRef idx="0">
-          <a:scrgbClr r="0" g="0" b="0"/>
-        </a:effectRef>
-        <a:fontRef idx="minor">
-          <a:schemeClr val="lt1"/>
-        </a:fontRef>
-      </dsp:style>
-    </dsp:sp>
-    <dsp:sp modelId="{26D480A3-7576-43E3-A933-0D6272033705}">
-      <dsp:nvSpPr>
-        <dsp:cNvPr id="0" name=""/>
-        <dsp:cNvSpPr/>
-      </dsp:nvSpPr>
-      <dsp:spPr>
-        <a:xfrm>
-          <a:off x="153193" y="2977637"/>
-          <a:ext cx="1353740" cy="859625"/>
-        </a:xfrm>
-        <a:prstGeom prst="roundRect">
-          <a:avLst>
-            <a:gd name="adj" fmla="val 10000"/>
-          </a:avLst>
-        </a:prstGeom>
-        <a:solidFill>
-          <a:schemeClr val="lt1">
-            <a:alpha val="90000"/>
-            <a:hueOff val="0"/>
-            <a:satOff val="0"/>
-            <a:lumOff val="0"/>
-            <a:alphaOff val="0"/>
-          </a:schemeClr>
-        </a:solidFill>
-        <a:ln w="12700" cap="flat" cmpd="sng" algn="ctr">
-          <a:solidFill>
-            <a:schemeClr val="accent1">
-              <a:hueOff val="0"/>
-              <a:satOff val="0"/>
-              <a:lumOff val="0"/>
-              <a:alphaOff val="0"/>
-            </a:schemeClr>
-          </a:solidFill>
-          <a:prstDash val="solid"/>
-          <a:miter lim="800000"/>
-        </a:ln>
-        <a:effectLst/>
-      </dsp:spPr>
-      <dsp:style>
-        <a:lnRef idx="2">
-          <a:scrgbClr r="0" g="0" b="0"/>
-        </a:lnRef>
-        <a:fillRef idx="1">
-          <a:scrgbClr r="0" g="0" b="0"/>
-        </a:fillRef>
-        <a:effectRef idx="0">
-          <a:scrgbClr r="0" g="0" b="0"/>
-        </a:effectRef>
-        <a:fontRef idx="minor"/>
-      </dsp:style>
-      <dsp:txBody>
-        <a:bodyPr spcFirstLastPara="0" vert="horz" wrap="square" lIns="64770" tIns="64770" rIns="64770" bIns="64770" numCol="1" spcCol="1270" anchor="ctr" anchorCtr="0">
-          <a:noAutofit/>
-        </a:bodyPr>
-        <a:lstStyle/>
-        <a:p>
-          <a:pPr marL="0" lvl="0" indent="0" algn="ctr" defTabSz="755650">
-            <a:lnSpc>
-              <a:spcPct val="90000"/>
-            </a:lnSpc>
-            <a:spcBef>
-              <a:spcPct val="0"/>
-            </a:spcBef>
-            <a:spcAft>
-              <a:spcPct val="35000"/>
-            </a:spcAft>
-            <a:buNone/>
-          </a:pPr>
-          <a:r>
-            <a:rPr lang="en-GB" sz="1700" kern="1200" dirty="0" err="1"/>
-            <a:t>Aloitussivu</a:t>
-          </a:r>
-          <a:endParaRPr lang="fi-FI" sz="1700" kern="1200" dirty="0"/>
-        </a:p>
-      </dsp:txBody>
-      <dsp:txXfrm>
-        <a:off x="178371" y="3002815"/>
+        <a:off x="2660229" y="1122808"/>
         <a:ext cx="1303384" cy="809269"/>
       </dsp:txXfrm>
     </dsp:sp>
@@ -1911,7 +2060,7 @@
       </dsp:nvSpPr>
       <dsp:spPr>
         <a:xfrm>
-          <a:off x="1657350" y="2834742"/>
+          <a:off x="2778" y="2208073"/>
           <a:ext cx="1353740" cy="859625"/>
         </a:xfrm>
         <a:prstGeom prst="roundRect">
@@ -1963,7 +2112,7 @@
       </dsp:nvSpPr>
       <dsp:spPr>
         <a:xfrm>
-          <a:off x="1807765" y="2977637"/>
+          <a:off x="153193" y="2350968"/>
           <a:ext cx="1353740" cy="859625"/>
         </a:xfrm>
         <a:prstGeom prst="roundRect">
@@ -2032,7 +2181,7 @@
         </a:p>
       </dsp:txBody>
       <dsp:txXfrm>
-        <a:off x="1832943" y="3002815"/>
+        <a:off x="178371" y="2376146"/>
         <a:ext cx="1303384" cy="809269"/>
       </dsp:txXfrm>
     </dsp:sp>
@@ -2043,7 +2192,7 @@
       </dsp:nvSpPr>
       <dsp:spPr>
         <a:xfrm>
-          <a:off x="3311921" y="2834742"/>
+          <a:off x="1657350" y="2208073"/>
           <a:ext cx="1353740" cy="859625"/>
         </a:xfrm>
         <a:prstGeom prst="roundRect">
@@ -2095,7 +2244,7 @@
       </dsp:nvSpPr>
       <dsp:spPr>
         <a:xfrm>
-          <a:off x="3462337" y="2977637"/>
+          <a:off x="1807765" y="2350968"/>
           <a:ext cx="1353740" cy="859625"/>
         </a:xfrm>
         <a:prstGeom prst="roundRect">
@@ -2164,7 +2313,7 @@
         </a:p>
       </dsp:txBody>
       <dsp:txXfrm>
-        <a:off x="3487515" y="3002815"/>
+        <a:off x="1832943" y="2376146"/>
         <a:ext cx="1303384" cy="809269"/>
       </dsp:txXfrm>
     </dsp:sp>
@@ -2175,7 +2324,7 @@
       </dsp:nvSpPr>
       <dsp:spPr>
         <a:xfrm>
-          <a:off x="4966493" y="2834742"/>
+          <a:off x="3311921" y="2208073"/>
           <a:ext cx="1353740" cy="859625"/>
         </a:xfrm>
         <a:prstGeom prst="roundRect">
@@ -2227,7 +2376,7 @@
       </dsp:nvSpPr>
       <dsp:spPr>
         <a:xfrm>
-          <a:off x="5116909" y="2977637"/>
+          <a:off x="3462337" y="2350968"/>
           <a:ext cx="1353740" cy="859625"/>
         </a:xfrm>
         <a:prstGeom prst="roundRect">
@@ -2296,18 +2445,18 @@
         </a:p>
       </dsp:txBody>
       <dsp:txXfrm>
-        <a:off x="5142087" y="3002815"/>
+        <a:off x="3487515" y="2376146"/>
         <a:ext cx="1303384" cy="809269"/>
       </dsp:txXfrm>
     </dsp:sp>
-    <dsp:sp modelId="{AA6E0DDA-D889-44AF-BBD0-D61FF7156885}">
+    <dsp:sp modelId="{D233D6D2-054F-48E7-8C44-C0FD9A30C172}">
       <dsp:nvSpPr>
         <dsp:cNvPr id="0" name=""/>
         <dsp:cNvSpPr/>
       </dsp:nvSpPr>
       <dsp:spPr>
         <a:xfrm>
-          <a:off x="6621065" y="2834742"/>
+          <a:off x="4966493" y="2208073"/>
           <a:ext cx="1353740" cy="859625"/>
         </a:xfrm>
         <a:prstGeom prst="roundRect">
@@ -2352,14 +2501,14 @@
         </a:fontRef>
       </dsp:style>
     </dsp:sp>
-    <dsp:sp modelId="{70893F41-43BD-430E-B0DB-F10C9F9F04A9}">
+    <dsp:sp modelId="{27C4145F-0850-4FE2-82D8-463685F5081F}">
       <dsp:nvSpPr>
         <dsp:cNvPr id="0" name=""/>
         <dsp:cNvSpPr/>
       </dsp:nvSpPr>
       <dsp:spPr>
         <a:xfrm>
-          <a:off x="6771481" y="2977637"/>
+          <a:off x="5116909" y="2350968"/>
           <a:ext cx="1353740" cy="859625"/>
         </a:xfrm>
         <a:prstGeom prst="roundRect">
@@ -2420,11 +2569,411 @@
             </a:spcAft>
             <a:buNone/>
           </a:pPr>
+          <a:r>
+            <a:rPr lang="en-GB" sz="1700" kern="1200" dirty="0" err="1"/>
+            <a:t>Testaus</a:t>
+          </a:r>
           <a:endParaRPr lang="fi-FI" sz="1700" kern="1200" dirty="0"/>
         </a:p>
       </dsp:txBody>
       <dsp:txXfrm>
-        <a:off x="6796659" y="3002815"/>
+        <a:off x="5142087" y="2376146"/>
+        <a:ext cx="1303384" cy="809269"/>
+      </dsp:txXfrm>
+    </dsp:sp>
+    <dsp:sp modelId="{DB80E178-DDA6-4A8F-B88C-E9B43EB86991}">
+      <dsp:nvSpPr>
+        <dsp:cNvPr id="0" name=""/>
+        <dsp:cNvSpPr/>
+      </dsp:nvSpPr>
+      <dsp:spPr>
+        <a:xfrm>
+          <a:off x="3311921" y="3461411"/>
+          <a:ext cx="1353740" cy="859625"/>
+        </a:xfrm>
+        <a:prstGeom prst="roundRect">
+          <a:avLst>
+            <a:gd name="adj" fmla="val 10000"/>
+          </a:avLst>
+        </a:prstGeom>
+        <a:solidFill>
+          <a:schemeClr val="accent1">
+            <a:hueOff val="0"/>
+            <a:satOff val="0"/>
+            <a:lumOff val="0"/>
+            <a:alphaOff val="0"/>
+          </a:schemeClr>
+        </a:solidFill>
+        <a:ln w="12700" cap="flat" cmpd="sng" algn="ctr">
+          <a:solidFill>
+            <a:schemeClr val="lt1">
+              <a:hueOff val="0"/>
+              <a:satOff val="0"/>
+              <a:lumOff val="0"/>
+              <a:alphaOff val="0"/>
+            </a:schemeClr>
+          </a:solidFill>
+          <a:prstDash val="solid"/>
+          <a:miter lim="800000"/>
+        </a:ln>
+        <a:effectLst/>
+      </dsp:spPr>
+      <dsp:style>
+        <a:lnRef idx="2">
+          <a:scrgbClr r="0" g="0" b="0"/>
+        </a:lnRef>
+        <a:fillRef idx="1">
+          <a:scrgbClr r="0" g="0" b="0"/>
+        </a:fillRef>
+        <a:effectRef idx="0">
+          <a:scrgbClr r="0" g="0" b="0"/>
+        </a:effectRef>
+        <a:fontRef idx="minor">
+          <a:schemeClr val="lt1"/>
+        </a:fontRef>
+      </dsp:style>
+    </dsp:sp>
+    <dsp:sp modelId="{166D3F28-A84D-46C3-A0DA-B2C2351FE975}">
+      <dsp:nvSpPr>
+        <dsp:cNvPr id="0" name=""/>
+        <dsp:cNvSpPr/>
+      </dsp:nvSpPr>
+      <dsp:spPr>
+        <a:xfrm>
+          <a:off x="3462337" y="3604306"/>
+          <a:ext cx="1353740" cy="859625"/>
+        </a:xfrm>
+        <a:prstGeom prst="roundRect">
+          <a:avLst>
+            <a:gd name="adj" fmla="val 10000"/>
+          </a:avLst>
+        </a:prstGeom>
+        <a:solidFill>
+          <a:schemeClr val="lt1">
+            <a:alpha val="90000"/>
+            <a:hueOff val="0"/>
+            <a:satOff val="0"/>
+            <a:lumOff val="0"/>
+            <a:alphaOff val="0"/>
+          </a:schemeClr>
+        </a:solidFill>
+        <a:ln w="12700" cap="flat" cmpd="sng" algn="ctr">
+          <a:solidFill>
+            <a:schemeClr val="accent1">
+              <a:hueOff val="0"/>
+              <a:satOff val="0"/>
+              <a:lumOff val="0"/>
+              <a:alphaOff val="0"/>
+            </a:schemeClr>
+          </a:solidFill>
+          <a:prstDash val="solid"/>
+          <a:miter lim="800000"/>
+        </a:ln>
+        <a:effectLst/>
+      </dsp:spPr>
+      <dsp:style>
+        <a:lnRef idx="2">
+          <a:scrgbClr r="0" g="0" b="0"/>
+        </a:lnRef>
+        <a:fillRef idx="1">
+          <a:scrgbClr r="0" g="0" b="0"/>
+        </a:fillRef>
+        <a:effectRef idx="0">
+          <a:scrgbClr r="0" g="0" b="0"/>
+        </a:effectRef>
+        <a:fontRef idx="minor"/>
+      </dsp:style>
+      <dsp:txBody>
+        <a:bodyPr spcFirstLastPara="0" vert="horz" wrap="square" lIns="64770" tIns="64770" rIns="64770" bIns="64770" numCol="1" spcCol="1270" anchor="ctr" anchorCtr="0">
+          <a:noAutofit/>
+        </a:bodyPr>
+        <a:lstStyle/>
+        <a:p>
+          <a:pPr marL="0" lvl="0" indent="0" algn="ctr" defTabSz="755650">
+            <a:lnSpc>
+              <a:spcPct val="90000"/>
+            </a:lnSpc>
+            <a:spcBef>
+              <a:spcPct val="0"/>
+            </a:spcBef>
+            <a:spcAft>
+              <a:spcPct val="35000"/>
+            </a:spcAft>
+            <a:buNone/>
+          </a:pPr>
+          <a:r>
+            <a:rPr lang="en-GB" sz="1700" kern="1200" dirty="0"/>
+            <a:t>Html</a:t>
+          </a:r>
+          <a:endParaRPr lang="fi-FI" sz="1700" kern="1200" dirty="0"/>
+        </a:p>
+      </dsp:txBody>
+      <dsp:txXfrm>
+        <a:off x="3487515" y="3629484"/>
+        <a:ext cx="1303384" cy="809269"/>
+      </dsp:txXfrm>
+    </dsp:sp>
+    <dsp:sp modelId="{71264332-18D3-4467-A50C-098BA6A39018}">
+      <dsp:nvSpPr>
+        <dsp:cNvPr id="0" name=""/>
+        <dsp:cNvSpPr/>
+      </dsp:nvSpPr>
+      <dsp:spPr>
+        <a:xfrm>
+          <a:off x="4966493" y="3461411"/>
+          <a:ext cx="1353740" cy="859625"/>
+        </a:xfrm>
+        <a:prstGeom prst="roundRect">
+          <a:avLst>
+            <a:gd name="adj" fmla="val 10000"/>
+          </a:avLst>
+        </a:prstGeom>
+        <a:solidFill>
+          <a:schemeClr val="accent1">
+            <a:hueOff val="0"/>
+            <a:satOff val="0"/>
+            <a:lumOff val="0"/>
+            <a:alphaOff val="0"/>
+          </a:schemeClr>
+        </a:solidFill>
+        <a:ln w="12700" cap="flat" cmpd="sng" algn="ctr">
+          <a:solidFill>
+            <a:schemeClr val="lt1">
+              <a:hueOff val="0"/>
+              <a:satOff val="0"/>
+              <a:lumOff val="0"/>
+              <a:alphaOff val="0"/>
+            </a:schemeClr>
+          </a:solidFill>
+          <a:prstDash val="solid"/>
+          <a:miter lim="800000"/>
+        </a:ln>
+        <a:effectLst/>
+      </dsp:spPr>
+      <dsp:style>
+        <a:lnRef idx="2">
+          <a:scrgbClr r="0" g="0" b="0"/>
+        </a:lnRef>
+        <a:fillRef idx="1">
+          <a:scrgbClr r="0" g="0" b="0"/>
+        </a:fillRef>
+        <a:effectRef idx="0">
+          <a:scrgbClr r="0" g="0" b="0"/>
+        </a:effectRef>
+        <a:fontRef idx="minor">
+          <a:schemeClr val="lt1"/>
+        </a:fontRef>
+      </dsp:style>
+    </dsp:sp>
+    <dsp:sp modelId="{74D8FE33-3EE2-44C7-923F-A1AA6E48FD3E}">
+      <dsp:nvSpPr>
+        <dsp:cNvPr id="0" name=""/>
+        <dsp:cNvSpPr/>
+      </dsp:nvSpPr>
+      <dsp:spPr>
+        <a:xfrm>
+          <a:off x="5116909" y="3604306"/>
+          <a:ext cx="1353740" cy="859625"/>
+        </a:xfrm>
+        <a:prstGeom prst="roundRect">
+          <a:avLst>
+            <a:gd name="adj" fmla="val 10000"/>
+          </a:avLst>
+        </a:prstGeom>
+        <a:solidFill>
+          <a:schemeClr val="lt1">
+            <a:alpha val="90000"/>
+            <a:hueOff val="0"/>
+            <a:satOff val="0"/>
+            <a:lumOff val="0"/>
+            <a:alphaOff val="0"/>
+          </a:schemeClr>
+        </a:solidFill>
+        <a:ln w="12700" cap="flat" cmpd="sng" algn="ctr">
+          <a:solidFill>
+            <a:schemeClr val="accent1">
+              <a:hueOff val="0"/>
+              <a:satOff val="0"/>
+              <a:lumOff val="0"/>
+              <a:alphaOff val="0"/>
+            </a:schemeClr>
+          </a:solidFill>
+          <a:prstDash val="solid"/>
+          <a:miter lim="800000"/>
+        </a:ln>
+        <a:effectLst/>
+      </dsp:spPr>
+      <dsp:style>
+        <a:lnRef idx="2">
+          <a:scrgbClr r="0" g="0" b="0"/>
+        </a:lnRef>
+        <a:fillRef idx="1">
+          <a:scrgbClr r="0" g="0" b="0"/>
+        </a:fillRef>
+        <a:effectRef idx="0">
+          <a:scrgbClr r="0" g="0" b="0"/>
+        </a:effectRef>
+        <a:fontRef idx="minor"/>
+      </dsp:style>
+      <dsp:txBody>
+        <a:bodyPr spcFirstLastPara="0" vert="horz" wrap="square" lIns="64770" tIns="64770" rIns="64770" bIns="64770" numCol="1" spcCol="1270" anchor="ctr" anchorCtr="0">
+          <a:noAutofit/>
+        </a:bodyPr>
+        <a:lstStyle/>
+        <a:p>
+          <a:pPr marL="0" lvl="0" indent="0" algn="ctr" defTabSz="755650">
+            <a:lnSpc>
+              <a:spcPct val="90000"/>
+            </a:lnSpc>
+            <a:spcBef>
+              <a:spcPct val="0"/>
+            </a:spcBef>
+            <a:spcAft>
+              <a:spcPct val="35000"/>
+            </a:spcAft>
+            <a:buNone/>
+          </a:pPr>
+          <a:r>
+            <a:rPr lang="en-GB" sz="1700" kern="1200" dirty="0" err="1"/>
+            <a:t>Javascript</a:t>
+          </a:r>
+          <a:endParaRPr lang="fi-FI" sz="1700" kern="1200" dirty="0"/>
+        </a:p>
+      </dsp:txBody>
+      <dsp:txXfrm>
+        <a:off x="5142087" y="3629484"/>
+        <a:ext cx="1303384" cy="809269"/>
+      </dsp:txXfrm>
+    </dsp:sp>
+    <dsp:sp modelId="{8CB573EC-A82F-4E7C-B633-A38BF714D7B9}">
+      <dsp:nvSpPr>
+        <dsp:cNvPr id="0" name=""/>
+        <dsp:cNvSpPr/>
+      </dsp:nvSpPr>
+      <dsp:spPr>
+        <a:xfrm>
+          <a:off x="6621065" y="3461411"/>
+          <a:ext cx="1353740" cy="859625"/>
+        </a:xfrm>
+        <a:prstGeom prst="roundRect">
+          <a:avLst>
+            <a:gd name="adj" fmla="val 10000"/>
+          </a:avLst>
+        </a:prstGeom>
+        <a:solidFill>
+          <a:schemeClr val="accent1">
+            <a:hueOff val="0"/>
+            <a:satOff val="0"/>
+            <a:lumOff val="0"/>
+            <a:alphaOff val="0"/>
+          </a:schemeClr>
+        </a:solidFill>
+        <a:ln w="12700" cap="flat" cmpd="sng" algn="ctr">
+          <a:solidFill>
+            <a:schemeClr val="lt1">
+              <a:hueOff val="0"/>
+              <a:satOff val="0"/>
+              <a:lumOff val="0"/>
+              <a:alphaOff val="0"/>
+            </a:schemeClr>
+          </a:solidFill>
+          <a:prstDash val="solid"/>
+          <a:miter lim="800000"/>
+        </a:ln>
+        <a:effectLst/>
+      </dsp:spPr>
+      <dsp:style>
+        <a:lnRef idx="2">
+          <a:scrgbClr r="0" g="0" b="0"/>
+        </a:lnRef>
+        <a:fillRef idx="1">
+          <a:scrgbClr r="0" g="0" b="0"/>
+        </a:fillRef>
+        <a:effectRef idx="0">
+          <a:scrgbClr r="0" g="0" b="0"/>
+        </a:effectRef>
+        <a:fontRef idx="minor">
+          <a:schemeClr val="lt1"/>
+        </a:fontRef>
+      </dsp:style>
+    </dsp:sp>
+    <dsp:sp modelId="{2F1DC9E2-3989-4D02-8C6B-4F714375E318}">
+      <dsp:nvSpPr>
+        <dsp:cNvPr id="0" name=""/>
+        <dsp:cNvSpPr/>
+      </dsp:nvSpPr>
+      <dsp:spPr>
+        <a:xfrm>
+          <a:off x="6771481" y="3604306"/>
+          <a:ext cx="1353740" cy="859625"/>
+        </a:xfrm>
+        <a:prstGeom prst="roundRect">
+          <a:avLst>
+            <a:gd name="adj" fmla="val 10000"/>
+          </a:avLst>
+        </a:prstGeom>
+        <a:solidFill>
+          <a:schemeClr val="lt1">
+            <a:alpha val="90000"/>
+            <a:hueOff val="0"/>
+            <a:satOff val="0"/>
+            <a:lumOff val="0"/>
+            <a:alphaOff val="0"/>
+          </a:schemeClr>
+        </a:solidFill>
+        <a:ln w="12700" cap="flat" cmpd="sng" algn="ctr">
+          <a:solidFill>
+            <a:schemeClr val="accent1">
+              <a:hueOff val="0"/>
+              <a:satOff val="0"/>
+              <a:lumOff val="0"/>
+              <a:alphaOff val="0"/>
+            </a:schemeClr>
+          </a:solidFill>
+          <a:prstDash val="solid"/>
+          <a:miter lim="800000"/>
+        </a:ln>
+        <a:effectLst/>
+      </dsp:spPr>
+      <dsp:style>
+        <a:lnRef idx="2">
+          <a:scrgbClr r="0" g="0" b="0"/>
+        </a:lnRef>
+        <a:fillRef idx="1">
+          <a:scrgbClr r="0" g="0" b="0"/>
+        </a:fillRef>
+        <a:effectRef idx="0">
+          <a:scrgbClr r="0" g="0" b="0"/>
+        </a:effectRef>
+        <a:fontRef idx="minor"/>
+      </dsp:style>
+      <dsp:txBody>
+        <a:bodyPr spcFirstLastPara="0" vert="horz" wrap="square" lIns="64770" tIns="64770" rIns="64770" bIns="64770" numCol="1" spcCol="1270" anchor="ctr" anchorCtr="0">
+          <a:noAutofit/>
+        </a:bodyPr>
+        <a:lstStyle/>
+        <a:p>
+          <a:pPr marL="0" lvl="0" indent="0" algn="ctr" defTabSz="755650">
+            <a:lnSpc>
+              <a:spcPct val="90000"/>
+            </a:lnSpc>
+            <a:spcBef>
+              <a:spcPct val="0"/>
+            </a:spcBef>
+            <a:spcAft>
+              <a:spcPct val="35000"/>
+            </a:spcAft>
+            <a:buNone/>
+          </a:pPr>
+          <a:r>
+            <a:rPr lang="en-GB" sz="1700" kern="1200" dirty="0"/>
+            <a:t>REST</a:t>
+          </a:r>
+          <a:endParaRPr lang="fi-FI" sz="1700" kern="1200" dirty="0"/>
+        </a:p>
+      </dsp:txBody>
+      <dsp:txXfrm>
+        <a:off x="6796659" y="3629484"/>
         <a:ext cx="1303384" cy="809269"/>
       </dsp:txXfrm>
     </dsp:sp>
@@ -4178,7 +4727,7 @@
           <a:p>
             <a:fld id="{4131E549-1B6C-4394-B07A-B6408EE8E47E}" type="datetimeFigureOut">
               <a:rPr lang="fi-FI" smtClean="0"/>
-              <a:t>11.9.2021</a:t>
+              <a:t>18.9.2021</a:t>
             </a:fld>
             <a:endParaRPr lang="fi-FI"/>
           </a:p>
@@ -4378,7 +4927,7 @@
           <a:p>
             <a:fld id="{4131E549-1B6C-4394-B07A-B6408EE8E47E}" type="datetimeFigureOut">
               <a:rPr lang="fi-FI" smtClean="0"/>
-              <a:t>11.9.2021</a:t>
+              <a:t>18.9.2021</a:t>
             </a:fld>
             <a:endParaRPr lang="fi-FI"/>
           </a:p>
@@ -4588,7 +5137,7 @@
           <a:p>
             <a:fld id="{4131E549-1B6C-4394-B07A-B6408EE8E47E}" type="datetimeFigureOut">
               <a:rPr lang="fi-FI" smtClean="0"/>
-              <a:t>11.9.2021</a:t>
+              <a:t>18.9.2021</a:t>
             </a:fld>
             <a:endParaRPr lang="fi-FI"/>
           </a:p>
@@ -4788,7 +5337,7 @@
           <a:p>
             <a:fld id="{4131E549-1B6C-4394-B07A-B6408EE8E47E}" type="datetimeFigureOut">
               <a:rPr lang="fi-FI" smtClean="0"/>
-              <a:t>11.9.2021</a:t>
+              <a:t>18.9.2021</a:t>
             </a:fld>
             <a:endParaRPr lang="fi-FI"/>
           </a:p>
@@ -5064,7 +5613,7 @@
           <a:p>
             <a:fld id="{4131E549-1B6C-4394-B07A-B6408EE8E47E}" type="datetimeFigureOut">
               <a:rPr lang="fi-FI" smtClean="0"/>
-              <a:t>11.9.2021</a:t>
+              <a:t>18.9.2021</a:t>
             </a:fld>
             <a:endParaRPr lang="fi-FI"/>
           </a:p>
@@ -5332,7 +5881,7 @@
           <a:p>
             <a:fld id="{4131E549-1B6C-4394-B07A-B6408EE8E47E}" type="datetimeFigureOut">
               <a:rPr lang="fi-FI" smtClean="0"/>
-              <a:t>11.9.2021</a:t>
+              <a:t>18.9.2021</a:t>
             </a:fld>
             <a:endParaRPr lang="fi-FI"/>
           </a:p>
@@ -5747,7 +6296,7 @@
           <a:p>
             <a:fld id="{4131E549-1B6C-4394-B07A-B6408EE8E47E}" type="datetimeFigureOut">
               <a:rPr lang="fi-FI" smtClean="0"/>
-              <a:t>11.9.2021</a:t>
+              <a:t>18.9.2021</a:t>
             </a:fld>
             <a:endParaRPr lang="fi-FI"/>
           </a:p>
@@ -5889,7 +6438,7 @@
           <a:p>
             <a:fld id="{4131E549-1B6C-4394-B07A-B6408EE8E47E}" type="datetimeFigureOut">
               <a:rPr lang="fi-FI" smtClean="0"/>
-              <a:t>11.9.2021</a:t>
+              <a:t>18.9.2021</a:t>
             </a:fld>
             <a:endParaRPr lang="fi-FI"/>
           </a:p>
@@ -6002,7 +6551,7 @@
           <a:p>
             <a:fld id="{4131E549-1B6C-4394-B07A-B6408EE8E47E}" type="datetimeFigureOut">
               <a:rPr lang="fi-FI" smtClean="0"/>
-              <a:t>11.9.2021</a:t>
+              <a:t>18.9.2021</a:t>
             </a:fld>
             <a:endParaRPr lang="fi-FI"/>
           </a:p>
@@ -6315,7 +6864,7 @@
           <a:p>
             <a:fld id="{4131E549-1B6C-4394-B07A-B6408EE8E47E}" type="datetimeFigureOut">
               <a:rPr lang="fi-FI" smtClean="0"/>
-              <a:t>11.9.2021</a:t>
+              <a:t>18.9.2021</a:t>
             </a:fld>
             <a:endParaRPr lang="fi-FI"/>
           </a:p>
@@ -6604,7 +7153,7 @@
           <a:p>
             <a:fld id="{4131E549-1B6C-4394-B07A-B6408EE8E47E}" type="datetimeFigureOut">
               <a:rPr lang="fi-FI" smtClean="0"/>
-              <a:t>11.9.2021</a:t>
+              <a:t>18.9.2021</a:t>
             </a:fld>
             <a:endParaRPr lang="fi-FI"/>
           </a:p>
@@ -6847,7 +7396,7 @@
           <a:p>
             <a:fld id="{4131E549-1B6C-4394-B07A-B6408EE8E47E}" type="datetimeFigureOut">
               <a:rPr lang="fi-FI" smtClean="0"/>
-              <a:t>11.9.2021</a:t>
+              <a:t>18.9.2021</a:t>
             </a:fld>
             <a:endParaRPr lang="fi-FI"/>
           </a:p>
@@ -7264,62 +7813,12 @@
           <a:chExt cx="0" cy="0"/>
         </a:xfrm>
       </p:grpSpPr>
-      <p:sp>
-        <p:nvSpPr>
-          <p:cNvPr id="2" name="Title 1">
-            <a:extLst>
-              <a:ext uri="{FF2B5EF4-FFF2-40B4-BE49-F238E27FC236}">
-                <a16:creationId xmlns:a16="http://schemas.microsoft.com/office/drawing/2014/main" id="{8391D589-B3C7-4FC5-BB17-46FDB585FB26}"/>
-              </a:ext>
-            </a:extLst>
-          </p:cNvPr>
-          <p:cNvSpPr>
-            <a:spLocks noGrp="1"/>
-          </p:cNvSpPr>
-          <p:nvPr>
-            <p:ph type="ctrTitle"/>
-          </p:nvPr>
-        </p:nvSpPr>
-        <p:spPr/>
-        <p:txBody>
-          <a:bodyPr/>
-          <a:lstStyle/>
-          <a:p>
-            <a:endParaRPr lang="fi-FI" dirty="0"/>
-          </a:p>
-        </p:txBody>
-      </p:sp>
-      <p:sp>
-        <p:nvSpPr>
-          <p:cNvPr id="3" name="Subtitle 2">
-            <a:extLst>
-              <a:ext uri="{FF2B5EF4-FFF2-40B4-BE49-F238E27FC236}">
-                <a16:creationId xmlns:a16="http://schemas.microsoft.com/office/drawing/2014/main" id="{912E8331-F027-4B8B-989C-F4526CD6817C}"/>
-              </a:ext>
-            </a:extLst>
-          </p:cNvPr>
-          <p:cNvSpPr>
-            <a:spLocks noGrp="1"/>
-          </p:cNvSpPr>
-          <p:nvPr>
-            <p:ph type="subTitle" idx="1"/>
-          </p:nvPr>
-        </p:nvSpPr>
-        <p:spPr/>
-        <p:txBody>
-          <a:bodyPr/>
-          <a:lstStyle/>
-          <a:p>
-            <a:endParaRPr lang="fi-FI" dirty="0"/>
-          </a:p>
-        </p:txBody>
-      </p:sp>
       <p:graphicFrame>
         <p:nvGraphicFramePr>
           <p:cNvPr id="4" name="Diagram 3">
             <a:extLst>
               <a:ext uri="{FF2B5EF4-FFF2-40B4-BE49-F238E27FC236}">
-                <a16:creationId xmlns:a16="http://schemas.microsoft.com/office/drawing/2014/main" id="{E8C795C8-8D08-426F-927F-7AD77A49F47A}"/>
+                <a16:creationId xmlns:a16="http://schemas.microsoft.com/office/drawing/2014/main" id="{98F636A5-BC9A-4DB0-AB37-B50F91D3CC2F}"/>
               </a:ext>
             </a:extLst>
           </p:cNvPr>
@@ -7327,7 +7826,7 @@
           <p:nvPr>
             <p:extLst>
               <p:ext uri="{D42A27DB-BD31-4B8C-83A1-F6EECF244321}">
-                <p14:modId xmlns:p14="http://schemas.microsoft.com/office/powerpoint/2010/main" val="3689248536"/>
+                <p14:modId xmlns:p14="http://schemas.microsoft.com/office/powerpoint/2010/main" val="2688842781"/>
               </p:ext>
             </p:extLst>
           </p:nvPr>
@@ -7345,7 +7844,7 @@
     </p:spTree>
     <p:extLst>
       <p:ext uri="{BB962C8B-B14F-4D97-AF65-F5344CB8AC3E}">
-        <p14:creationId xmlns:p14="http://schemas.microsoft.com/office/powerpoint/2010/main" val="2101953830"/>
+        <p14:creationId xmlns:p14="http://schemas.microsoft.com/office/powerpoint/2010/main" val="1884137356"/>
       </p:ext>
     </p:extLst>
   </p:cSld>

</xml_diff>